<commit_message>
polar Plot finished, Theta now < 90, some bugs removed, Energy spectrum is divided by E
</commit_message>
<xml_diff>
--- a/pictures.pptx
+++ b/pictures.pptx
@@ -166,10 +166,9 @@
           </a:lstStyle>
           <a:p>
             <a:r>
-              <a:rPr lang="ru-RU" smtClean="0"/>
+              <a:rPr lang="ru-RU"/>
               <a:t>Образец заголовка</a:t>
             </a:r>
-            <a:endParaRPr lang="ru-RU"/>
           </a:p>
         </p:txBody>
       </p:sp>
@@ -231,10 +230,9 @@
           </a:lstStyle>
           <a:p>
             <a:r>
-              <a:rPr lang="ru-RU" smtClean="0"/>
+              <a:rPr lang="ru-RU"/>
               <a:t>Образец подзаголовка</a:t>
             </a:r>
-            <a:endParaRPr lang="ru-RU"/>
           </a:p>
         </p:txBody>
       </p:sp>
@@ -255,7 +253,7 @@
           <a:p>
             <a:fld id="{0BCAC639-30B3-41D2-99B8-FB7EB2DDCB37}" type="datetimeFigureOut">
               <a:rPr lang="ru-RU" smtClean="0"/>
-              <a:t>30.06.2019</a:t>
+              <a:t>28.09.2020</a:t>
             </a:fld>
             <a:endParaRPr lang="ru-RU"/>
           </a:p>
@@ -349,10 +347,9 @@
           <a:lstStyle/>
           <a:p>
             <a:r>
-              <a:rPr lang="ru-RU" smtClean="0"/>
+              <a:rPr lang="ru-RU"/>
               <a:t>Образец заголовка</a:t>
             </a:r>
-            <a:endParaRPr lang="ru-RU"/>
           </a:p>
         </p:txBody>
       </p:sp>
@@ -373,38 +370,37 @@
           <a:p>
             <a:pPr lvl="0"/>
             <a:r>
-              <a:rPr lang="ru-RU" smtClean="0"/>
+              <a:rPr lang="ru-RU"/>
               <a:t>Образец текста</a:t>
             </a:r>
           </a:p>
           <a:p>
             <a:pPr lvl="1"/>
             <a:r>
-              <a:rPr lang="ru-RU" smtClean="0"/>
+              <a:rPr lang="ru-RU"/>
               <a:t>Второй уровень</a:t>
             </a:r>
           </a:p>
           <a:p>
             <a:pPr lvl="2"/>
             <a:r>
-              <a:rPr lang="ru-RU" smtClean="0"/>
+              <a:rPr lang="ru-RU"/>
               <a:t>Третий уровень</a:t>
             </a:r>
           </a:p>
           <a:p>
             <a:pPr lvl="3"/>
             <a:r>
-              <a:rPr lang="ru-RU" smtClean="0"/>
+              <a:rPr lang="ru-RU"/>
               <a:t>Четвертый уровень</a:t>
             </a:r>
           </a:p>
           <a:p>
             <a:pPr lvl="4"/>
             <a:r>
-              <a:rPr lang="ru-RU" smtClean="0"/>
+              <a:rPr lang="ru-RU"/>
               <a:t>Пятый уровень</a:t>
             </a:r>
-            <a:endParaRPr lang="ru-RU"/>
           </a:p>
         </p:txBody>
       </p:sp>
@@ -425,7 +421,7 @@
           <a:p>
             <a:fld id="{0BCAC639-30B3-41D2-99B8-FB7EB2DDCB37}" type="datetimeFigureOut">
               <a:rPr lang="ru-RU" smtClean="0"/>
-              <a:t>30.06.2019</a:t>
+              <a:t>28.09.2020</a:t>
             </a:fld>
             <a:endParaRPr lang="ru-RU"/>
           </a:p>
@@ -524,10 +520,9 @@
           <a:lstStyle/>
           <a:p>
             <a:r>
-              <a:rPr lang="ru-RU" smtClean="0"/>
+              <a:rPr lang="ru-RU"/>
               <a:t>Образец заголовка</a:t>
             </a:r>
-            <a:endParaRPr lang="ru-RU"/>
           </a:p>
         </p:txBody>
       </p:sp>
@@ -553,38 +548,37 @@
           <a:p>
             <a:pPr lvl="0"/>
             <a:r>
-              <a:rPr lang="ru-RU" smtClean="0"/>
+              <a:rPr lang="ru-RU"/>
               <a:t>Образец текста</a:t>
             </a:r>
           </a:p>
           <a:p>
             <a:pPr lvl="1"/>
             <a:r>
-              <a:rPr lang="ru-RU" smtClean="0"/>
+              <a:rPr lang="ru-RU"/>
               <a:t>Второй уровень</a:t>
             </a:r>
           </a:p>
           <a:p>
             <a:pPr lvl="2"/>
             <a:r>
-              <a:rPr lang="ru-RU" smtClean="0"/>
+              <a:rPr lang="ru-RU"/>
               <a:t>Третий уровень</a:t>
             </a:r>
           </a:p>
           <a:p>
             <a:pPr lvl="3"/>
             <a:r>
-              <a:rPr lang="ru-RU" smtClean="0"/>
+              <a:rPr lang="ru-RU"/>
               <a:t>Четвертый уровень</a:t>
             </a:r>
           </a:p>
           <a:p>
             <a:pPr lvl="4"/>
             <a:r>
-              <a:rPr lang="ru-RU" smtClean="0"/>
+              <a:rPr lang="ru-RU"/>
               <a:t>Пятый уровень</a:t>
             </a:r>
-            <a:endParaRPr lang="ru-RU"/>
           </a:p>
         </p:txBody>
       </p:sp>
@@ -605,7 +599,7 @@
           <a:p>
             <a:fld id="{0BCAC639-30B3-41D2-99B8-FB7EB2DDCB37}" type="datetimeFigureOut">
               <a:rPr lang="ru-RU" smtClean="0"/>
-              <a:t>30.06.2019</a:t>
+              <a:t>28.09.2020</a:t>
             </a:fld>
             <a:endParaRPr lang="ru-RU"/>
           </a:p>
@@ -699,10 +693,9 @@
           <a:lstStyle/>
           <a:p>
             <a:r>
-              <a:rPr lang="ru-RU" smtClean="0"/>
+              <a:rPr lang="ru-RU"/>
               <a:t>Образец заголовка</a:t>
             </a:r>
-            <a:endParaRPr lang="ru-RU"/>
           </a:p>
         </p:txBody>
       </p:sp>
@@ -723,38 +716,37 @@
           <a:p>
             <a:pPr lvl="0"/>
             <a:r>
-              <a:rPr lang="ru-RU" smtClean="0"/>
+              <a:rPr lang="ru-RU"/>
               <a:t>Образец текста</a:t>
             </a:r>
           </a:p>
           <a:p>
             <a:pPr lvl="1"/>
             <a:r>
-              <a:rPr lang="ru-RU" smtClean="0"/>
+              <a:rPr lang="ru-RU"/>
               <a:t>Второй уровень</a:t>
             </a:r>
           </a:p>
           <a:p>
             <a:pPr lvl="2"/>
             <a:r>
-              <a:rPr lang="ru-RU" smtClean="0"/>
+              <a:rPr lang="ru-RU"/>
               <a:t>Третий уровень</a:t>
             </a:r>
           </a:p>
           <a:p>
             <a:pPr lvl="3"/>
             <a:r>
-              <a:rPr lang="ru-RU" smtClean="0"/>
+              <a:rPr lang="ru-RU"/>
               <a:t>Четвертый уровень</a:t>
             </a:r>
           </a:p>
           <a:p>
             <a:pPr lvl="4"/>
             <a:r>
-              <a:rPr lang="ru-RU" smtClean="0"/>
+              <a:rPr lang="ru-RU"/>
               <a:t>Пятый уровень</a:t>
             </a:r>
-            <a:endParaRPr lang="ru-RU"/>
           </a:p>
         </p:txBody>
       </p:sp>
@@ -775,7 +767,7 @@
           <a:p>
             <a:fld id="{0BCAC639-30B3-41D2-99B8-FB7EB2DDCB37}" type="datetimeFigureOut">
               <a:rPr lang="ru-RU" smtClean="0"/>
-              <a:t>30.06.2019</a:t>
+              <a:t>28.09.2020</a:t>
             </a:fld>
             <a:endParaRPr lang="ru-RU"/>
           </a:p>
@@ -878,10 +870,9 @@
           </a:lstStyle>
           <a:p>
             <a:r>
-              <a:rPr lang="ru-RU" smtClean="0"/>
+              <a:rPr lang="ru-RU"/>
               <a:t>Образец заголовка</a:t>
             </a:r>
-            <a:endParaRPr lang="ru-RU"/>
           </a:p>
         </p:txBody>
       </p:sp>
@@ -998,7 +989,7 @@
           <a:p>
             <a:pPr lvl="0"/>
             <a:r>
-              <a:rPr lang="ru-RU" smtClean="0"/>
+              <a:rPr lang="ru-RU"/>
               <a:t>Образец текста</a:t>
             </a:r>
           </a:p>
@@ -1021,7 +1012,7 @@
           <a:p>
             <a:fld id="{0BCAC639-30B3-41D2-99B8-FB7EB2DDCB37}" type="datetimeFigureOut">
               <a:rPr lang="ru-RU" smtClean="0"/>
-              <a:t>30.06.2019</a:t>
+              <a:t>28.09.2020</a:t>
             </a:fld>
             <a:endParaRPr lang="ru-RU"/>
           </a:p>
@@ -1115,10 +1106,9 @@
           <a:lstStyle/>
           <a:p>
             <a:r>
-              <a:rPr lang="ru-RU" smtClean="0"/>
+              <a:rPr lang="ru-RU"/>
               <a:t>Образец заголовка</a:t>
             </a:r>
-            <a:endParaRPr lang="ru-RU"/>
           </a:p>
         </p:txBody>
       </p:sp>
@@ -1144,38 +1134,37 @@
           <a:p>
             <a:pPr lvl="0"/>
             <a:r>
-              <a:rPr lang="ru-RU" smtClean="0"/>
+              <a:rPr lang="ru-RU"/>
               <a:t>Образец текста</a:t>
             </a:r>
           </a:p>
           <a:p>
             <a:pPr lvl="1"/>
             <a:r>
-              <a:rPr lang="ru-RU" smtClean="0"/>
+              <a:rPr lang="ru-RU"/>
               <a:t>Второй уровень</a:t>
             </a:r>
           </a:p>
           <a:p>
             <a:pPr lvl="2"/>
             <a:r>
-              <a:rPr lang="ru-RU" smtClean="0"/>
+              <a:rPr lang="ru-RU"/>
               <a:t>Третий уровень</a:t>
             </a:r>
           </a:p>
           <a:p>
             <a:pPr lvl="3"/>
             <a:r>
-              <a:rPr lang="ru-RU" smtClean="0"/>
+              <a:rPr lang="ru-RU"/>
               <a:t>Четвертый уровень</a:t>
             </a:r>
           </a:p>
           <a:p>
             <a:pPr lvl="4"/>
             <a:r>
-              <a:rPr lang="ru-RU" smtClean="0"/>
+              <a:rPr lang="ru-RU"/>
               <a:t>Пятый уровень</a:t>
             </a:r>
-            <a:endParaRPr lang="ru-RU"/>
           </a:p>
         </p:txBody>
       </p:sp>
@@ -1201,38 +1190,37 @@
           <a:p>
             <a:pPr lvl="0"/>
             <a:r>
-              <a:rPr lang="ru-RU" smtClean="0"/>
+              <a:rPr lang="ru-RU"/>
               <a:t>Образец текста</a:t>
             </a:r>
           </a:p>
           <a:p>
             <a:pPr lvl="1"/>
             <a:r>
-              <a:rPr lang="ru-RU" smtClean="0"/>
+              <a:rPr lang="ru-RU"/>
               <a:t>Второй уровень</a:t>
             </a:r>
           </a:p>
           <a:p>
             <a:pPr lvl="2"/>
             <a:r>
-              <a:rPr lang="ru-RU" smtClean="0"/>
+              <a:rPr lang="ru-RU"/>
               <a:t>Третий уровень</a:t>
             </a:r>
           </a:p>
           <a:p>
             <a:pPr lvl="3"/>
             <a:r>
-              <a:rPr lang="ru-RU" smtClean="0"/>
+              <a:rPr lang="ru-RU"/>
               <a:t>Четвертый уровень</a:t>
             </a:r>
           </a:p>
           <a:p>
             <a:pPr lvl="4"/>
             <a:r>
-              <a:rPr lang="ru-RU" smtClean="0"/>
+              <a:rPr lang="ru-RU"/>
               <a:t>Пятый уровень</a:t>
             </a:r>
-            <a:endParaRPr lang="ru-RU"/>
           </a:p>
         </p:txBody>
       </p:sp>
@@ -1253,7 +1241,7 @@
           <a:p>
             <a:fld id="{0BCAC639-30B3-41D2-99B8-FB7EB2DDCB37}" type="datetimeFigureOut">
               <a:rPr lang="ru-RU" smtClean="0"/>
-              <a:t>30.06.2019</a:t>
+              <a:t>28.09.2020</a:t>
             </a:fld>
             <a:endParaRPr lang="ru-RU"/>
           </a:p>
@@ -1352,10 +1340,9 @@
           <a:lstStyle/>
           <a:p>
             <a:r>
-              <a:rPr lang="ru-RU" smtClean="0"/>
+              <a:rPr lang="ru-RU"/>
               <a:t>Образец заголовка</a:t>
             </a:r>
-            <a:endParaRPr lang="ru-RU"/>
           </a:p>
         </p:txBody>
       </p:sp>
@@ -1418,7 +1405,7 @@
           <a:p>
             <a:pPr lvl="0"/>
             <a:r>
-              <a:rPr lang="ru-RU" smtClean="0"/>
+              <a:rPr lang="ru-RU"/>
               <a:t>Образец текста</a:t>
             </a:r>
           </a:p>
@@ -1446,38 +1433,37 @@
           <a:p>
             <a:pPr lvl="0"/>
             <a:r>
-              <a:rPr lang="ru-RU" smtClean="0"/>
+              <a:rPr lang="ru-RU"/>
               <a:t>Образец текста</a:t>
             </a:r>
           </a:p>
           <a:p>
             <a:pPr lvl="1"/>
             <a:r>
-              <a:rPr lang="ru-RU" smtClean="0"/>
+              <a:rPr lang="ru-RU"/>
               <a:t>Второй уровень</a:t>
             </a:r>
           </a:p>
           <a:p>
             <a:pPr lvl="2"/>
             <a:r>
-              <a:rPr lang="ru-RU" smtClean="0"/>
+              <a:rPr lang="ru-RU"/>
               <a:t>Третий уровень</a:t>
             </a:r>
           </a:p>
           <a:p>
             <a:pPr lvl="3"/>
             <a:r>
-              <a:rPr lang="ru-RU" smtClean="0"/>
+              <a:rPr lang="ru-RU"/>
               <a:t>Четвертый уровень</a:t>
             </a:r>
           </a:p>
           <a:p>
             <a:pPr lvl="4"/>
             <a:r>
-              <a:rPr lang="ru-RU" smtClean="0"/>
+              <a:rPr lang="ru-RU"/>
               <a:t>Пятый уровень</a:t>
             </a:r>
-            <a:endParaRPr lang="ru-RU"/>
           </a:p>
         </p:txBody>
       </p:sp>
@@ -1540,7 +1526,7 @@
           <a:p>
             <a:pPr lvl="0"/>
             <a:r>
-              <a:rPr lang="ru-RU" smtClean="0"/>
+              <a:rPr lang="ru-RU"/>
               <a:t>Образец текста</a:t>
             </a:r>
           </a:p>
@@ -1568,38 +1554,37 @@
           <a:p>
             <a:pPr lvl="0"/>
             <a:r>
-              <a:rPr lang="ru-RU" smtClean="0"/>
+              <a:rPr lang="ru-RU"/>
               <a:t>Образец текста</a:t>
             </a:r>
           </a:p>
           <a:p>
             <a:pPr lvl="1"/>
             <a:r>
-              <a:rPr lang="ru-RU" smtClean="0"/>
+              <a:rPr lang="ru-RU"/>
               <a:t>Второй уровень</a:t>
             </a:r>
           </a:p>
           <a:p>
             <a:pPr lvl="2"/>
             <a:r>
-              <a:rPr lang="ru-RU" smtClean="0"/>
+              <a:rPr lang="ru-RU"/>
               <a:t>Третий уровень</a:t>
             </a:r>
           </a:p>
           <a:p>
             <a:pPr lvl="3"/>
             <a:r>
-              <a:rPr lang="ru-RU" smtClean="0"/>
+              <a:rPr lang="ru-RU"/>
               <a:t>Четвертый уровень</a:t>
             </a:r>
           </a:p>
           <a:p>
             <a:pPr lvl="4"/>
             <a:r>
-              <a:rPr lang="ru-RU" smtClean="0"/>
+              <a:rPr lang="ru-RU"/>
               <a:t>Пятый уровень</a:t>
             </a:r>
-            <a:endParaRPr lang="ru-RU"/>
           </a:p>
         </p:txBody>
       </p:sp>
@@ -1620,7 +1605,7 @@
           <a:p>
             <a:fld id="{0BCAC639-30B3-41D2-99B8-FB7EB2DDCB37}" type="datetimeFigureOut">
               <a:rPr lang="ru-RU" smtClean="0"/>
-              <a:t>30.06.2019</a:t>
+              <a:t>28.09.2020</a:t>
             </a:fld>
             <a:endParaRPr lang="ru-RU"/>
           </a:p>
@@ -1714,10 +1699,9 @@
           <a:lstStyle/>
           <a:p>
             <a:r>
-              <a:rPr lang="ru-RU" smtClean="0"/>
+              <a:rPr lang="ru-RU"/>
               <a:t>Образец заголовка</a:t>
             </a:r>
-            <a:endParaRPr lang="ru-RU"/>
           </a:p>
         </p:txBody>
       </p:sp>
@@ -1738,7 +1722,7 @@
           <a:p>
             <a:fld id="{0BCAC639-30B3-41D2-99B8-FB7EB2DDCB37}" type="datetimeFigureOut">
               <a:rPr lang="ru-RU" smtClean="0"/>
-              <a:t>30.06.2019</a:t>
+              <a:t>28.09.2020</a:t>
             </a:fld>
             <a:endParaRPr lang="ru-RU"/>
           </a:p>
@@ -1833,7 +1817,7 @@
           <a:p>
             <a:fld id="{0BCAC639-30B3-41D2-99B8-FB7EB2DDCB37}" type="datetimeFigureOut">
               <a:rPr lang="ru-RU" smtClean="0"/>
-              <a:t>30.06.2019</a:t>
+              <a:t>28.09.2020</a:t>
             </a:fld>
             <a:endParaRPr lang="ru-RU"/>
           </a:p>
@@ -1936,10 +1920,9 @@
           </a:lstStyle>
           <a:p>
             <a:r>
-              <a:rPr lang="ru-RU" smtClean="0"/>
+              <a:rPr lang="ru-RU"/>
               <a:t>Образец заголовка</a:t>
             </a:r>
-            <a:endParaRPr lang="ru-RU"/>
           </a:p>
         </p:txBody>
       </p:sp>
@@ -1993,38 +1976,37 @@
           <a:p>
             <a:pPr lvl="0"/>
             <a:r>
-              <a:rPr lang="ru-RU" smtClean="0"/>
+              <a:rPr lang="ru-RU"/>
               <a:t>Образец текста</a:t>
             </a:r>
           </a:p>
           <a:p>
             <a:pPr lvl="1"/>
             <a:r>
-              <a:rPr lang="ru-RU" smtClean="0"/>
+              <a:rPr lang="ru-RU"/>
               <a:t>Второй уровень</a:t>
             </a:r>
           </a:p>
           <a:p>
             <a:pPr lvl="2"/>
             <a:r>
-              <a:rPr lang="ru-RU" smtClean="0"/>
+              <a:rPr lang="ru-RU"/>
               <a:t>Третий уровень</a:t>
             </a:r>
           </a:p>
           <a:p>
             <a:pPr lvl="3"/>
             <a:r>
-              <a:rPr lang="ru-RU" smtClean="0"/>
+              <a:rPr lang="ru-RU"/>
               <a:t>Четвертый уровень</a:t>
             </a:r>
           </a:p>
           <a:p>
             <a:pPr lvl="4"/>
             <a:r>
-              <a:rPr lang="ru-RU" smtClean="0"/>
+              <a:rPr lang="ru-RU"/>
               <a:t>Пятый уровень</a:t>
             </a:r>
-            <a:endParaRPr lang="ru-RU"/>
           </a:p>
         </p:txBody>
       </p:sp>
@@ -2087,7 +2069,7 @@
           <a:p>
             <a:pPr lvl="0"/>
             <a:r>
-              <a:rPr lang="ru-RU" smtClean="0"/>
+              <a:rPr lang="ru-RU"/>
               <a:t>Образец текста</a:t>
             </a:r>
           </a:p>
@@ -2110,7 +2092,7 @@
           <a:p>
             <a:fld id="{0BCAC639-30B3-41D2-99B8-FB7EB2DDCB37}" type="datetimeFigureOut">
               <a:rPr lang="ru-RU" smtClean="0"/>
-              <a:t>30.06.2019</a:t>
+              <a:t>28.09.2020</a:t>
             </a:fld>
             <a:endParaRPr lang="ru-RU"/>
           </a:p>
@@ -2213,10 +2195,9 @@
           </a:lstStyle>
           <a:p>
             <a:r>
-              <a:rPr lang="ru-RU" smtClean="0"/>
+              <a:rPr lang="ru-RU"/>
               <a:t>Образец заголовка</a:t>
             </a:r>
-            <a:endParaRPr lang="ru-RU"/>
           </a:p>
         </p:txBody>
       </p:sp>
@@ -2340,7 +2321,7 @@
           <a:p>
             <a:pPr lvl="0"/>
             <a:r>
-              <a:rPr lang="ru-RU" smtClean="0"/>
+              <a:rPr lang="ru-RU"/>
               <a:t>Образец текста</a:t>
             </a:r>
           </a:p>
@@ -2363,7 +2344,7 @@
           <a:p>
             <a:fld id="{0BCAC639-30B3-41D2-99B8-FB7EB2DDCB37}" type="datetimeFigureOut">
               <a:rPr lang="ru-RU" smtClean="0"/>
-              <a:t>30.06.2019</a:t>
+              <a:t>28.09.2020</a:t>
             </a:fld>
             <a:endParaRPr lang="ru-RU"/>
           </a:p>
@@ -2472,10 +2453,9 @@
           <a:lstStyle/>
           <a:p>
             <a:r>
-              <a:rPr lang="ru-RU" smtClean="0"/>
+              <a:rPr lang="ru-RU"/>
               <a:t>Образец заголовка</a:t>
             </a:r>
-            <a:endParaRPr lang="ru-RU"/>
           </a:p>
         </p:txBody>
       </p:sp>
@@ -2506,38 +2486,37 @@
           <a:p>
             <a:pPr lvl="0"/>
             <a:r>
-              <a:rPr lang="ru-RU" smtClean="0"/>
+              <a:rPr lang="ru-RU"/>
               <a:t>Образец текста</a:t>
             </a:r>
           </a:p>
           <a:p>
             <a:pPr lvl="1"/>
             <a:r>
-              <a:rPr lang="ru-RU" smtClean="0"/>
+              <a:rPr lang="ru-RU"/>
               <a:t>Второй уровень</a:t>
             </a:r>
           </a:p>
           <a:p>
             <a:pPr lvl="2"/>
             <a:r>
-              <a:rPr lang="ru-RU" smtClean="0"/>
+              <a:rPr lang="ru-RU"/>
               <a:t>Третий уровень</a:t>
             </a:r>
           </a:p>
           <a:p>
             <a:pPr lvl="3"/>
             <a:r>
-              <a:rPr lang="ru-RU" smtClean="0"/>
+              <a:rPr lang="ru-RU"/>
               <a:t>Четвертый уровень</a:t>
             </a:r>
           </a:p>
           <a:p>
             <a:pPr lvl="4"/>
             <a:r>
-              <a:rPr lang="ru-RU" smtClean="0"/>
+              <a:rPr lang="ru-RU"/>
               <a:t>Пятый уровень</a:t>
             </a:r>
-            <a:endParaRPr lang="ru-RU"/>
           </a:p>
         </p:txBody>
       </p:sp>
@@ -2576,7 +2555,7 @@
           <a:p>
             <a:fld id="{0BCAC639-30B3-41D2-99B8-FB7EB2DDCB37}" type="datetimeFigureOut">
               <a:rPr lang="ru-RU" smtClean="0"/>
-              <a:t>30.06.2019</a:t>
+              <a:t>28.09.2020</a:t>
             </a:fld>
             <a:endParaRPr lang="ru-RU"/>
           </a:p>
@@ -2981,8 +2960,8 @@
           <a:chExt cx="0" cy="0"/>
         </a:xfrm>
       </p:grpSpPr>
-      <mc:AlternateContent xmlns:mc="http://schemas.openxmlformats.org/markup-compatibility/2006">
-        <mc:Choice xmlns:a14="http://schemas.microsoft.com/office/drawing/2010/main" Requires="a14">
+      <mc:AlternateContent xmlns:mc="http://schemas.openxmlformats.org/markup-compatibility/2006" xmlns:a14="http://schemas.microsoft.com/office/drawing/2010/main">
+        <mc:Choice Requires="a14">
           <p:sp>
             <p:nvSpPr>
               <p:cNvPr id="5" name="Горизонтальный свиток 4"/>
@@ -3037,7 +3016,7 @@
               <a:p>
                 <a:pPr algn="ctr"/>
                 <a:r>
-                  <a:rPr lang="ru-RU" sz="2800" u="sng" dirty="0" smtClean="0">
+                  <a:rPr lang="ru-RU" sz="2800" u="sng" dirty="0">
                     <a:solidFill>
                       <a:schemeClr val="tx1"/>
                     </a:solidFill>
@@ -3047,7 +3026,7 @@
                   <a:t>Основы расчёта в </a:t>
                 </a:r>
                 <a:r>
-                  <a:rPr lang="en-US" sz="2800" u="sng" dirty="0" err="1" smtClean="0">
+                  <a:rPr lang="en-US" sz="2800" u="sng" dirty="0" err="1">
                     <a:solidFill>
                       <a:schemeClr val="tx1"/>
                     </a:solidFill>
@@ -3056,7 +3035,7 @@
                   </a:rPr>
                   <a:t>ScatterAnalyzer</a:t>
                 </a:r>
-                <a:endParaRPr lang="ru-RU" sz="2800" u="sng" dirty="0" smtClean="0">
+                <a:endParaRPr lang="ru-RU" sz="2800" u="sng" dirty="0">
                   <a:solidFill>
                     <a:schemeClr val="tx1"/>
                   </a:solidFill>
@@ -3067,34 +3046,14 @@
               <a:p>
                 <a:pPr algn="just"/>
                 <a:r>
-                  <a:rPr lang="ru-RU" sz="2800" dirty="0" smtClean="0">
-                    <a:solidFill>
-                      <a:schemeClr val="tx1"/>
-                    </a:solidFill>
-                    <a:latin typeface="Times New Roman" panose="02020603050405020304" pitchFamily="18" charset="0"/>
-                    <a:cs typeface="Times New Roman" panose="02020603050405020304" pitchFamily="18" charset="0"/>
-                  </a:rPr>
-                  <a:t>       Программа </a:t>
-                </a:r>
-                <a:r>
-                  <a:rPr lang="ru-RU" sz="2800" dirty="0" smtClean="0">
-                    <a:solidFill>
-                      <a:schemeClr val="tx1"/>
-                    </a:solidFill>
-                    <a:latin typeface="Times New Roman" panose="02020603050405020304" pitchFamily="18" charset="0"/>
-                    <a:cs typeface="Times New Roman" panose="02020603050405020304" pitchFamily="18" charset="0"/>
-                  </a:rPr>
-                  <a:t>предназначена для анализа данных, получаемых в результате работы  </a:t>
-                </a:r>
-                <a:r>
-                  <a:rPr lang="en-US" sz="2800" dirty="0" smtClean="0">
-                    <a:solidFill>
-                      <a:schemeClr val="tx1"/>
-                    </a:solidFill>
-                    <a:latin typeface="Times New Roman" panose="02020603050405020304" pitchFamily="18" charset="0"/>
-                    <a:cs typeface="Times New Roman" panose="02020603050405020304" pitchFamily="18" charset="0"/>
-                  </a:rPr>
-                  <a:t>SCATTER</a:t>
+                  <a:rPr lang="ru-RU" sz="2800" dirty="0">
+                    <a:solidFill>
+                      <a:schemeClr val="tx1"/>
+                    </a:solidFill>
+                    <a:latin typeface="Times New Roman" panose="02020603050405020304" pitchFamily="18" charset="0"/>
+                    <a:cs typeface="Times New Roman" panose="02020603050405020304" pitchFamily="18" charset="0"/>
+                  </a:rPr>
+                  <a:t>       Программа предназначена для анализа данных, получаемых в результате работы  </a:t>
                 </a:r>
                 <a:r>
                   <a:rPr lang="en-US" sz="2800" dirty="0">
@@ -3104,60 +3063,50 @@
                     <a:latin typeface="Times New Roman" panose="02020603050405020304" pitchFamily="18" charset="0"/>
                     <a:cs typeface="Times New Roman" panose="02020603050405020304" pitchFamily="18" charset="0"/>
                   </a:rPr>
+                  <a:t>SCATTER </a:t>
+                </a:r>
+                <a:r>
+                  <a:rPr lang="ru-RU" sz="2800" dirty="0">
+                    <a:solidFill>
+                      <a:schemeClr val="tx1"/>
+                    </a:solidFill>
+                    <a:latin typeface="Times New Roman" panose="02020603050405020304" pitchFamily="18" charset="0"/>
+                    <a:cs typeface="Times New Roman" panose="02020603050405020304" pitchFamily="18" charset="0"/>
+                  </a:rPr>
+                  <a:t>и </a:t>
+                </a:r>
+                <a:r>
+                  <a:rPr lang="en-US" sz="2800" dirty="0">
+                    <a:solidFill>
+                      <a:schemeClr val="tx1"/>
+                    </a:solidFill>
+                    <a:latin typeface="Times New Roman" panose="02020603050405020304" pitchFamily="18" charset="0"/>
+                    <a:cs typeface="Times New Roman" panose="02020603050405020304" pitchFamily="18" charset="0"/>
+                  </a:rPr>
+                  <a:t>TRIM. </a:t>
+                </a:r>
+                <a:r>
+                  <a:rPr lang="ru-RU" sz="2800" dirty="0">
+                    <a:solidFill>
+                      <a:schemeClr val="tx1"/>
+                    </a:solidFill>
+                    <a:latin typeface="Times New Roman" panose="02020603050405020304" pitchFamily="18" charset="0"/>
+                    <a:cs typeface="Times New Roman" panose="02020603050405020304" pitchFamily="18" charset="0"/>
+                  </a:rPr>
+                  <a:t>Возможно</a:t>
+                </a:r>
+                <a:r>
+                  <a:rPr lang="en-US" sz="2800" dirty="0">
+                    <a:solidFill>
+                      <a:schemeClr val="tx1"/>
+                    </a:solidFill>
+                    <a:latin typeface="Times New Roman" panose="02020603050405020304" pitchFamily="18" charset="0"/>
+                    <a:cs typeface="Times New Roman" panose="02020603050405020304" pitchFamily="18" charset="0"/>
+                  </a:rPr>
                   <a:t> </a:t>
                 </a:r>
                 <a:r>
-                  <a:rPr lang="ru-RU" sz="2800" dirty="0" smtClean="0">
-                    <a:solidFill>
-                      <a:schemeClr val="tx1"/>
-                    </a:solidFill>
-                    <a:latin typeface="Times New Roman" panose="02020603050405020304" pitchFamily="18" charset="0"/>
-                    <a:cs typeface="Times New Roman" panose="02020603050405020304" pitchFamily="18" charset="0"/>
-                  </a:rPr>
-                  <a:t>и </a:t>
-                </a:r>
-                <a:r>
-                  <a:rPr lang="en-US" sz="2800" dirty="0" smtClean="0">
-                    <a:solidFill>
-                      <a:schemeClr val="tx1"/>
-                    </a:solidFill>
-                    <a:latin typeface="Times New Roman" panose="02020603050405020304" pitchFamily="18" charset="0"/>
-                    <a:cs typeface="Times New Roman" panose="02020603050405020304" pitchFamily="18" charset="0"/>
-                  </a:rPr>
-                  <a:t>TRIM</a:t>
-                </a:r>
-                <a:r>
-                  <a:rPr lang="en-US" sz="2800" dirty="0" smtClean="0">
-                    <a:solidFill>
-                      <a:schemeClr val="tx1"/>
-                    </a:solidFill>
-                    <a:latin typeface="Times New Roman" panose="02020603050405020304" pitchFamily="18" charset="0"/>
-                    <a:cs typeface="Times New Roman" panose="02020603050405020304" pitchFamily="18" charset="0"/>
-                  </a:rPr>
-                  <a:t>. </a:t>
-                </a:r>
-                <a:r>
-                  <a:rPr lang="ru-RU" sz="2800" dirty="0" smtClean="0">
-                    <a:solidFill>
-                      <a:schemeClr val="tx1"/>
-                    </a:solidFill>
-                    <a:latin typeface="Times New Roman" panose="02020603050405020304" pitchFamily="18" charset="0"/>
-                    <a:cs typeface="Times New Roman" panose="02020603050405020304" pitchFamily="18" charset="0"/>
-                  </a:rPr>
-                  <a:t>Возможно</a:t>
-                </a:r>
-                <a:r>
-                  <a:rPr lang="en-US" sz="2800" dirty="0" smtClean="0">
-                    <a:solidFill>
-                      <a:schemeClr val="tx1"/>
-                    </a:solidFill>
-                    <a:latin typeface="Times New Roman" panose="02020603050405020304" pitchFamily="18" charset="0"/>
-                    <a:cs typeface="Times New Roman" panose="02020603050405020304" pitchFamily="18" charset="0"/>
-                  </a:rPr>
-                  <a:t> </a:t>
-                </a:r>
-                <a:r>
-                  <a:rPr lang="ru-RU" sz="2800" dirty="0" smtClean="0">
+                  <a:rPr lang="ru-RU" sz="2800" dirty="0">
                     <a:solidFill>
                       <a:schemeClr val="tx1"/>
                     </a:solidFill>
@@ -3172,7 +3121,7 @@
                   <a:buAutoNum type="arabicParenR"/>
                 </a:pPr>
                 <a:r>
-                  <a:rPr lang="ru-RU" sz="2800" dirty="0" smtClean="0">
+                  <a:rPr lang="ru-RU" sz="2800" dirty="0">
                     <a:solidFill>
                       <a:schemeClr val="tx1"/>
                     </a:solidFill>
@@ -3182,7 +3131,7 @@
                   <a:t>Энергетический спектр рассеянных(распылённых) частиц: для расчёта нужно указать в окне </a:t>
                 </a:r>
                 <a:r>
-                  <a:rPr lang="en-US" sz="2800" dirty="0" smtClean="0">
+                  <a:rPr lang="en-US" sz="2800" dirty="0">
                     <a:solidFill>
                       <a:schemeClr val="tx1"/>
                     </a:solidFill>
@@ -3192,7 +3141,7 @@
                   <a:t>“</a:t>
                 </a:r>
                 <a:r>
-                  <a:rPr lang="en-US" sz="2800" dirty="0" err="1" smtClean="0">
+                  <a:rPr lang="en-US" sz="2800" dirty="0" err="1">
                     <a:solidFill>
                       <a:schemeClr val="tx1"/>
                     </a:solidFill>
@@ -3202,7 +3151,7 @@
                   <a:t>dN</a:t>
                 </a:r>
                 <a:r>
-                  <a:rPr lang="en-US" sz="2800" dirty="0" smtClean="0">
+                  <a:rPr lang="en-US" sz="2800" dirty="0">
                     <a:solidFill>
                       <a:schemeClr val="tx1"/>
                     </a:solidFill>
@@ -3212,7 +3161,7 @@
                   <a:t>/</a:t>
                 </a:r>
                 <a:r>
-                  <a:rPr lang="en-US" sz="2800" dirty="0" err="1" smtClean="0">
+                  <a:rPr lang="en-US" sz="2800" dirty="0" err="1">
                     <a:solidFill>
                       <a:schemeClr val="tx1"/>
                     </a:solidFill>
@@ -3222,7 +3171,7 @@
                   <a:t>dE</a:t>
                 </a:r>
                 <a:r>
-                  <a:rPr lang="en-US" sz="2800" dirty="0" smtClean="0">
+                  <a:rPr lang="en-US" sz="2800" dirty="0">
                     <a:solidFill>
                       <a:schemeClr val="tx1"/>
                     </a:solidFill>
@@ -3232,7 +3181,7 @@
                   <a:t>(E)”</a:t>
                 </a:r>
                 <a:r>
-                  <a:rPr lang="ru-RU" sz="2800" dirty="0" smtClean="0">
+                  <a:rPr lang="ru-RU" sz="2800" dirty="0">
                     <a:solidFill>
                       <a:schemeClr val="tx1"/>
                     </a:solidFill>
@@ -3242,7 +3191,7 @@
                   <a:t> начальную энергию частиц </a:t>
                 </a:r>
                 <a:r>
-                  <a:rPr lang="en-US" sz="2800" dirty="0" smtClean="0">
+                  <a:rPr lang="en-US" sz="2800" dirty="0">
                     <a:solidFill>
                       <a:schemeClr val="tx1"/>
                     </a:solidFill>
@@ -3252,7 +3201,7 @@
                   <a:t>E0</a:t>
                 </a:r>
                 <a:r>
-                  <a:rPr lang="ru-RU" sz="2800" dirty="0" smtClean="0">
+                  <a:rPr lang="ru-RU" sz="2800" dirty="0">
                     <a:solidFill>
                       <a:schemeClr val="tx1"/>
                     </a:solidFill>
@@ -3262,7 +3211,7 @@
                   <a:t> (в случае </a:t>
                 </a:r>
                 <a:r>
-                  <a:rPr lang="en-US" sz="2800" dirty="0" smtClean="0">
+                  <a:rPr lang="en-US" sz="2800" dirty="0">
                     <a:solidFill>
                       <a:schemeClr val="tx1"/>
                     </a:solidFill>
@@ -3272,7 +3221,7 @@
                   <a:t>TRIM </a:t>
                 </a:r>
                 <a:r>
-                  <a:rPr lang="ru-RU" sz="2800" dirty="0" smtClean="0">
+                  <a:rPr lang="ru-RU" sz="2800" dirty="0">
                     <a:solidFill>
                       <a:schemeClr val="tx1"/>
                     </a:solidFill>
@@ -3282,7 +3231,7 @@
                   <a:t>это необязательно, т.к. в файле </a:t>
                 </a:r>
                 <a:r>
-                  <a:rPr lang="en-US" sz="2800" dirty="0" smtClean="0">
+                  <a:rPr lang="en-US" sz="2800" dirty="0">
                     <a:solidFill>
                       <a:schemeClr val="tx1"/>
                     </a:solidFill>
@@ -3292,7 +3241,7 @@
                   <a:t>TRIM </a:t>
                 </a:r>
                 <a:r>
-                  <a:rPr lang="ru-RU" sz="2800" dirty="0" smtClean="0">
+                  <a:rPr lang="ru-RU" sz="2800" dirty="0">
                     <a:solidFill>
                       <a:schemeClr val="tx1"/>
                     </a:solidFill>
@@ -3302,7 +3251,7 @@
                   <a:t>содержится значение энергии), шаг </a:t>
                 </a:r>
                 <a:r>
-                  <a:rPr lang="en-US" sz="2800" dirty="0" err="1" smtClean="0">
+                  <a:rPr lang="en-US" sz="2800" dirty="0" err="1">
                     <a:solidFill>
                       <a:schemeClr val="tx1"/>
                     </a:solidFill>
@@ -3319,150 +3268,80 @@
                     <a:latin typeface="Times New Roman" panose="02020603050405020304" pitchFamily="18" charset="0"/>
                     <a:cs typeface="Times New Roman" panose="02020603050405020304" pitchFamily="18" charset="0"/>
                   </a:rPr>
+                  <a:t> (который определяет количество точек на спектр), и телесный угол регистрации частиц (если задать </a:t>
+                </a:r>
+                <a:r>
+                  <a:rPr lang="en-US" sz="2800" dirty="0">
+                    <a:solidFill>
+                      <a:schemeClr val="tx1"/>
+                    </a:solidFill>
+                    <a:latin typeface="Times New Roman" panose="02020603050405020304" pitchFamily="18" charset="0"/>
+                    <a:cs typeface="Times New Roman" panose="02020603050405020304" pitchFamily="18" charset="0"/>
+                  </a:rPr>
+                  <a:t>d</a:t>
+                </a:r>
+                <a:r>
+                  <a:rPr lang="el-GR" sz="2800" dirty="0">
+                    <a:solidFill>
+                      <a:schemeClr val="tx1"/>
+                    </a:solidFill>
+                    <a:latin typeface="Times New Roman" panose="02020603050405020304" pitchFamily="18" charset="0"/>
+                    <a:cs typeface="Times New Roman" panose="02020603050405020304" pitchFamily="18" charset="0"/>
+                  </a:rPr>
+                  <a:t>φ</a:t>
+                </a:r>
+                <a:r>
+                  <a:rPr lang="ru-RU" sz="2800" dirty="0">
+                    <a:solidFill>
+                      <a:schemeClr val="tx1"/>
+                    </a:solidFill>
+                    <a:latin typeface="Times New Roman" panose="02020603050405020304" pitchFamily="18" charset="0"/>
+                    <a:cs typeface="Times New Roman" panose="02020603050405020304" pitchFamily="18" charset="0"/>
+                  </a:rPr>
+                  <a:t> и </a:t>
+                </a:r>
+                <a:r>
+                  <a:rPr lang="en-US" sz="2800" dirty="0">
+                    <a:solidFill>
+                      <a:schemeClr val="tx1"/>
+                    </a:solidFill>
+                    <a:latin typeface="Times New Roman" panose="02020603050405020304" pitchFamily="18" charset="0"/>
+                    <a:cs typeface="Times New Roman" panose="02020603050405020304" pitchFamily="18" charset="0"/>
+                  </a:rPr>
+                  <a:t>d</a:t>
+                </a:r>
+                <a:r>
+                  <a:rPr lang="el-GR" sz="2800" dirty="0">
+                    <a:solidFill>
+                      <a:schemeClr val="tx1"/>
+                    </a:solidFill>
+                    <a:latin typeface="Times New Roman" panose="02020603050405020304" pitchFamily="18" charset="0"/>
+                    <a:cs typeface="Times New Roman" panose="02020603050405020304" pitchFamily="18" charset="0"/>
+                  </a:rPr>
+                  <a:t>θ</a:t>
+                </a:r>
+                <a:r>
+                  <a:rPr lang="en-US" sz="2800" dirty="0">
+                    <a:solidFill>
+                      <a:schemeClr val="tx1"/>
+                    </a:solidFill>
+                    <a:latin typeface="Times New Roman" panose="02020603050405020304" pitchFamily="18" charset="0"/>
+                    <a:cs typeface="Times New Roman" panose="02020603050405020304" pitchFamily="18" charset="0"/>
+                  </a:rPr>
                   <a:t> </a:t>
                 </a:r>
                 <a:r>
-                  <a:rPr lang="ru-RU" sz="2800" dirty="0" smtClean="0">
-                    <a:solidFill>
-                      <a:schemeClr val="tx1"/>
-                    </a:solidFill>
-                    <a:latin typeface="Times New Roman" panose="02020603050405020304" pitchFamily="18" charset="0"/>
-                    <a:cs typeface="Times New Roman" panose="02020603050405020304" pitchFamily="18" charset="0"/>
-                  </a:rPr>
-                  <a:t>(который определяет количество точек на спектр), и телесный угол регистрации частиц (если задать </a:t>
-                </a:r>
-                <a:r>
-                  <a:rPr lang="en-US" sz="2800" dirty="0" smtClean="0">
-                    <a:solidFill>
-                      <a:schemeClr val="tx1"/>
-                    </a:solidFill>
-                    <a:latin typeface="Times New Roman" panose="02020603050405020304" pitchFamily="18" charset="0"/>
-                    <a:cs typeface="Times New Roman" panose="02020603050405020304" pitchFamily="18" charset="0"/>
-                  </a:rPr>
-                  <a:t>d</a:t>
-                </a:r>
-                <a:r>
-                  <a:rPr lang="el-GR" sz="2800" dirty="0" smtClean="0">
-                    <a:solidFill>
-                      <a:schemeClr val="tx1"/>
-                    </a:solidFill>
-                    <a:latin typeface="Times New Roman" panose="02020603050405020304" pitchFamily="18" charset="0"/>
-                    <a:cs typeface="Times New Roman" panose="02020603050405020304" pitchFamily="18" charset="0"/>
-                  </a:rPr>
-                  <a:t>φ</a:t>
-                </a:r>
-                <a:r>
-                  <a:rPr lang="ru-RU" sz="2800" dirty="0" smtClean="0">
-                    <a:solidFill>
-                      <a:schemeClr val="tx1"/>
-                    </a:solidFill>
-                    <a:latin typeface="Times New Roman" panose="02020603050405020304" pitchFamily="18" charset="0"/>
-                    <a:cs typeface="Times New Roman" panose="02020603050405020304" pitchFamily="18" charset="0"/>
-                  </a:rPr>
-                  <a:t> и </a:t>
-                </a:r>
-                <a:r>
-                  <a:rPr lang="en-US" sz="2800" dirty="0" smtClean="0">
-                    <a:solidFill>
-                      <a:schemeClr val="tx1"/>
-                    </a:solidFill>
-                    <a:latin typeface="Times New Roman" panose="02020603050405020304" pitchFamily="18" charset="0"/>
-                    <a:cs typeface="Times New Roman" panose="02020603050405020304" pitchFamily="18" charset="0"/>
-                  </a:rPr>
-                  <a:t>d</a:t>
-                </a:r>
-                <a:r>
-                  <a:rPr lang="el-GR" sz="2800" dirty="0" smtClean="0">
-                    <a:solidFill>
-                      <a:schemeClr val="tx1"/>
-                    </a:solidFill>
-                    <a:latin typeface="Times New Roman" panose="02020603050405020304" pitchFamily="18" charset="0"/>
-                    <a:cs typeface="Times New Roman" panose="02020603050405020304" pitchFamily="18" charset="0"/>
-                  </a:rPr>
-                  <a:t>θ</a:t>
-                </a:r>
-                <a:r>
-                  <a:rPr lang="en-US" sz="2800" dirty="0" smtClean="0">
-                    <a:solidFill>
-                      <a:schemeClr val="tx1"/>
-                    </a:solidFill>
-                    <a:latin typeface="Times New Roman" panose="02020603050405020304" pitchFamily="18" charset="0"/>
-                    <a:cs typeface="Times New Roman" panose="02020603050405020304" pitchFamily="18" charset="0"/>
-                  </a:rPr>
-                  <a:t> </a:t>
-                </a:r>
-                <a:r>
-                  <a:rPr lang="ru-RU" sz="2800" dirty="0" smtClean="0">
-                    <a:solidFill>
-                      <a:schemeClr val="tx1"/>
-                    </a:solidFill>
-                    <a:latin typeface="Times New Roman" panose="02020603050405020304" pitchFamily="18" charset="0"/>
-                    <a:cs typeface="Times New Roman" panose="02020603050405020304" pitchFamily="18" charset="0"/>
-                  </a:rPr>
-                  <a:t>большими, </a:t>
-                </a:r>
-                <a:r>
-                  <a:rPr lang="ru-RU" sz="2800" dirty="0" smtClean="0">
-                    <a:solidFill>
-                      <a:schemeClr val="tx1"/>
-                    </a:solidFill>
-                    <a:latin typeface="Times New Roman" panose="02020603050405020304" pitchFamily="18" charset="0"/>
-                    <a:cs typeface="Times New Roman" panose="02020603050405020304" pitchFamily="18" charset="0"/>
-                  </a:rPr>
-                  <a:t>получим </a:t>
-                </a:r>
-                <a:r>
-                  <a:rPr lang="ru-RU" sz="2800" dirty="0" smtClean="0">
-                    <a:solidFill>
-                      <a:schemeClr val="tx1"/>
-                    </a:solidFill>
-                    <a:latin typeface="Times New Roman" panose="02020603050405020304" pitchFamily="18" charset="0"/>
-                    <a:cs typeface="Times New Roman" panose="02020603050405020304" pitchFamily="18" charset="0"/>
-                  </a:rPr>
-                  <a:t>спектр </a:t>
-                </a:r>
-                <a:r>
-                  <a:rPr lang="ru-RU" sz="2800" dirty="0" smtClean="0">
-                    <a:solidFill>
-                      <a:schemeClr val="tx1"/>
-                    </a:solidFill>
-                    <a:latin typeface="Times New Roman" panose="02020603050405020304" pitchFamily="18" charset="0"/>
-                    <a:cs typeface="Times New Roman" panose="02020603050405020304" pitchFamily="18" charset="0"/>
-                  </a:rPr>
-                  <a:t>по всем направлениям</a:t>
-                </a:r>
-                <a:r>
-                  <a:rPr lang="ru-RU" sz="2800" dirty="0" smtClean="0">
-                    <a:solidFill>
-                      <a:schemeClr val="tx1"/>
-                    </a:solidFill>
-                    <a:latin typeface="Times New Roman" panose="02020603050405020304" pitchFamily="18" charset="0"/>
-                    <a:cs typeface="Times New Roman" panose="02020603050405020304" pitchFamily="18" charset="0"/>
-                  </a:rPr>
-                  <a:t>). </a:t>
-                </a:r>
-                <a:r>
-                  <a:rPr lang="ru-RU" sz="2800" dirty="0" smtClean="0">
-                    <a:solidFill>
-                      <a:schemeClr val="tx1"/>
-                    </a:solidFill>
-                    <a:latin typeface="Times New Roman" panose="02020603050405020304" pitchFamily="18" charset="0"/>
-                    <a:cs typeface="Times New Roman" panose="02020603050405020304" pitchFamily="18" charset="0"/>
-                  </a:rPr>
-                  <a:t>Наконец, необходимо выбрать тип регистрируемых </a:t>
-                </a:r>
-                <a:r>
-                  <a:rPr lang="ru-RU" sz="2800" dirty="0" smtClean="0">
-                    <a:solidFill>
-                      <a:schemeClr val="tx1"/>
-                    </a:solidFill>
-                    <a:latin typeface="Times New Roman" panose="02020603050405020304" pitchFamily="18" charset="0"/>
-                    <a:cs typeface="Times New Roman" panose="02020603050405020304" pitchFamily="18" charset="0"/>
-                  </a:rPr>
-                  <a:t>частиц в нижнем окне: </a:t>
-                </a:r>
-                <a:r>
-                  <a:rPr lang="en-US" sz="2800" dirty="0" smtClean="0">
+                  <a:rPr lang="ru-RU" sz="2800" dirty="0">
+                    <a:solidFill>
+                      <a:schemeClr val="tx1"/>
+                    </a:solidFill>
+                    <a:latin typeface="Times New Roman" panose="02020603050405020304" pitchFamily="18" charset="0"/>
+                    <a:cs typeface="Times New Roman" panose="02020603050405020304" pitchFamily="18" charset="0"/>
+                  </a:rPr>
+                  <a:t>большими, получим спектр по всем направлениям). Наконец, необходимо выбрать тип регистрируемых частиц в нижнем окне: </a:t>
+                </a:r>
+                <a:r>
+                  <a:rPr lang="en-US" sz="2800" dirty="0">
                     <a:solidFill>
                       <a:schemeClr val="tx1"/>
                     </a:solidFill>
@@ -3472,7 +3351,7 @@
                   <a:t>R</a:t>
                 </a:r>
                 <a:r>
-                  <a:rPr lang="ru-RU" sz="2800" dirty="0" smtClean="0">
+                  <a:rPr lang="ru-RU" sz="2800" dirty="0">
                     <a:solidFill>
                       <a:schemeClr val="tx1"/>
                     </a:solidFill>
@@ -3482,7 +3361,7 @@
                   <a:t> (отражённые</a:t>
                 </a:r>
                 <a:r>
-                  <a:rPr lang="en-US" sz="2800" dirty="0" smtClean="0">
+                  <a:rPr lang="en-US" sz="2800" dirty="0">
                     <a:solidFill>
                       <a:schemeClr val="tx1"/>
                     </a:solidFill>
@@ -3492,7 +3371,7 @@
                   <a:t>)</a:t>
                 </a:r>
                 <a:r>
-                  <a:rPr lang="ru-RU" sz="2800" dirty="0" smtClean="0">
+                  <a:rPr lang="ru-RU" sz="2800" dirty="0">
                     <a:solidFill>
                       <a:schemeClr val="tx1"/>
                     </a:solidFill>
@@ -3502,7 +3381,7 @@
                   <a:t> и</a:t>
                 </a:r>
                 <a:r>
-                  <a:rPr lang="en-US" sz="2800" dirty="0" smtClean="0">
+                  <a:rPr lang="en-US" sz="2800" dirty="0">
                     <a:solidFill>
                       <a:schemeClr val="tx1"/>
                     </a:solidFill>
@@ -3512,7 +3391,7 @@
                   <a:t>/</a:t>
                 </a:r>
                 <a:r>
-                  <a:rPr lang="ru-RU" sz="2800" dirty="0" smtClean="0">
+                  <a:rPr lang="ru-RU" sz="2800" dirty="0">
                     <a:solidFill>
                       <a:schemeClr val="tx1"/>
                     </a:solidFill>
@@ -3522,7 +3401,7 @@
                   <a:t>или </a:t>
                 </a:r>
                 <a:r>
-                  <a:rPr lang="en-US" sz="2800" dirty="0" smtClean="0">
+                  <a:rPr lang="en-US" sz="2800" dirty="0">
                     <a:solidFill>
                       <a:schemeClr val="tx1"/>
                     </a:solidFill>
@@ -3532,7 +3411,7 @@
                   <a:t>Y (</a:t>
                 </a:r>
                 <a:r>
-                  <a:rPr lang="ru-RU" sz="2800" dirty="0" smtClean="0">
+                  <a:rPr lang="ru-RU" sz="2800" dirty="0">
                     <a:solidFill>
                       <a:schemeClr val="tx1"/>
                     </a:solidFill>
@@ -3542,7 +3421,7 @@
                   <a:t>распылённые</a:t>
                 </a:r>
                 <a:r>
-                  <a:rPr lang="en-US" sz="2800" dirty="0" smtClean="0">
+                  <a:rPr lang="en-US" sz="2800" dirty="0">
                     <a:solidFill>
                       <a:schemeClr val="tx1"/>
                     </a:solidFill>
@@ -3551,7 +3430,7 @@
                   </a:rPr>
                   <a:t>)</a:t>
                 </a:r>
-                <a:endParaRPr lang="ru-RU" sz="2800" dirty="0" smtClean="0">
+                <a:endParaRPr lang="ru-RU" sz="2800" dirty="0">
                   <a:solidFill>
                     <a:schemeClr val="tx1"/>
                   </a:solidFill>
@@ -3564,7 +3443,7 @@
                   <a:buAutoNum type="arabicParenR"/>
                 </a:pPr>
                 <a:r>
-                  <a:rPr lang="ru-RU" sz="2800" dirty="0" smtClean="0">
+                  <a:rPr lang="ru-RU" sz="2800" dirty="0">
                     <a:solidFill>
                       <a:schemeClr val="tx1"/>
                     </a:solidFill>
@@ -3574,7 +3453,7 @@
                   <a:t>Угловое </a:t>
                 </a:r>
                 <a:r>
-                  <a:rPr lang="el-GR" sz="2800" dirty="0" smtClean="0">
+                  <a:rPr lang="el-GR" sz="2800" dirty="0">
                     <a:solidFill>
                       <a:schemeClr val="tx1"/>
                     </a:solidFill>
@@ -3591,40 +3470,10 @@
                     <a:latin typeface="Times New Roman" panose="02020603050405020304" pitchFamily="18" charset="0"/>
                     <a:cs typeface="Times New Roman" panose="02020603050405020304" pitchFamily="18" charset="0"/>
                   </a:rPr>
-                  <a:t>-</a:t>
-                </a:r>
-                <a:r>
-                  <a:rPr lang="ru-RU" sz="2800" dirty="0" smtClean="0">
-                    <a:solidFill>
-                      <a:schemeClr val="tx1"/>
-                    </a:solidFill>
-                    <a:latin typeface="Times New Roman" panose="02020603050405020304" pitchFamily="18" charset="0"/>
-                    <a:cs typeface="Times New Roman" panose="02020603050405020304" pitchFamily="18" charset="0"/>
-                  </a:rPr>
-                  <a:t>распределение </a:t>
-                </a:r>
-                <a:r>
-                  <a:rPr lang="ru-RU" sz="2800" dirty="0" smtClean="0">
-                    <a:solidFill>
-                      <a:schemeClr val="tx1"/>
-                    </a:solidFill>
-                    <a:latin typeface="Times New Roman" panose="02020603050405020304" pitchFamily="18" charset="0"/>
-                    <a:cs typeface="Times New Roman" panose="02020603050405020304" pitchFamily="18" charset="0"/>
-                  </a:rPr>
-                  <a:t>отражённых (</a:t>
-                </a:r>
-                <a:r>
-                  <a:rPr lang="ru-RU" sz="2800" dirty="0" smtClean="0">
-                    <a:solidFill>
-                      <a:schemeClr val="tx1"/>
-                    </a:solidFill>
-                    <a:latin typeface="Times New Roman" panose="02020603050405020304" pitchFamily="18" charset="0"/>
-                    <a:cs typeface="Times New Roman" panose="02020603050405020304" pitchFamily="18" charset="0"/>
-                  </a:rPr>
-                  <a:t>и</a:t>
-                </a:r>
-                <a:r>
-                  <a:rPr lang="en-US" sz="2800" dirty="0" smtClean="0">
+                  <a:t>-распределение отражённых (и</a:t>
+                </a:r>
+                <a:r>
+                  <a:rPr lang="en-US" sz="2800" dirty="0">
                     <a:solidFill>
                       <a:schemeClr val="tx1"/>
                     </a:solidFill>
@@ -3634,7 +3483,7 @@
                   <a:t>/</a:t>
                 </a:r>
                 <a:r>
-                  <a:rPr lang="ru-RU" sz="2800" dirty="0" smtClean="0">
+                  <a:rPr lang="ru-RU" sz="2800" dirty="0">
                     <a:solidFill>
                       <a:schemeClr val="tx1"/>
                     </a:solidFill>
@@ -3644,7 +3493,7 @@
                   <a:t>или распылённых) + внедрённых: в этом случае нужно указать угол </a:t>
                 </a:r>
                 <a:r>
-                  <a:rPr lang="el-GR" sz="2800" dirty="0" smtClean="0">
+                  <a:rPr lang="el-GR" sz="2800" dirty="0">
                     <a:solidFill>
                       <a:schemeClr val="tx1"/>
                     </a:solidFill>
@@ -3654,7 +3503,7 @@
                   <a:t>φ</a:t>
                 </a:r>
                 <a:r>
-                  <a:rPr lang="ru-RU" sz="2800" dirty="0" smtClean="0">
+                  <a:rPr lang="ru-RU" sz="2800" dirty="0">
                     <a:solidFill>
                       <a:schemeClr val="tx1"/>
                     </a:solidFill>
@@ -3664,7 +3513,7 @@
                   <a:t>, который определит плоскость, по которой будет рассчитываться спектр. При этом углы </a:t>
                 </a:r>
                 <a:r>
-                  <a:rPr lang="el-GR" sz="2800" dirty="0" smtClean="0">
+                  <a:rPr lang="el-GR" sz="2800" dirty="0">
                     <a:solidFill>
                       <a:schemeClr val="tx1"/>
                     </a:solidFill>
@@ -3674,7 +3523,7 @@
                   <a:t>θ</a:t>
                 </a:r>
                 <a:r>
-                  <a:rPr lang="en-US" sz="2800" dirty="0" smtClean="0">
+                  <a:rPr lang="en-US" sz="2800" dirty="0">
                     <a:solidFill>
                       <a:schemeClr val="tx1"/>
                     </a:solidFill>
@@ -3684,7 +3533,7 @@
                   <a:t> &lt;</a:t>
                 </a:r>
                 <a:r>
-                  <a:rPr lang="ru-RU" sz="2800" dirty="0" smtClean="0">
+                  <a:rPr lang="ru-RU" sz="2800" dirty="0">
                     <a:solidFill>
                       <a:schemeClr val="tx1"/>
                     </a:solidFill>
@@ -3694,7 +3543,7 @@
                   <a:t>180</a:t>
                 </a:r>
                 <a:r>
-                  <a:rPr lang="en-US" sz="2800" dirty="0" smtClean="0">
+                  <a:rPr lang="en-US" sz="2800" dirty="0">
                     <a:solidFill>
                       <a:schemeClr val="tx1"/>
                     </a:solidFill>
@@ -3704,7 +3553,7 @@
                   <a:t> </a:t>
                 </a:r>
                 <a:r>
-                  <a:rPr lang="ru-RU" sz="2800" dirty="0" smtClean="0">
+                  <a:rPr lang="ru-RU" sz="2800" dirty="0">
                     <a:solidFill>
                       <a:schemeClr val="tx1"/>
                     </a:solidFill>
@@ -3714,7 +3563,7 @@
                   <a:t>определяют рассеянные</a:t>
                 </a:r>
                 <a:r>
-                  <a:rPr lang="en-US" sz="2800" dirty="0" smtClean="0">
+                  <a:rPr lang="en-US" sz="2800" dirty="0">
                     <a:solidFill>
                       <a:schemeClr val="tx1"/>
                     </a:solidFill>
@@ -3724,7 +3573,7 @@
                   <a:t> (</a:t>
                 </a:r>
                 <a:r>
-                  <a:rPr lang="ru-RU" sz="2800" dirty="0" smtClean="0">
+                  <a:rPr lang="ru-RU" sz="2800" dirty="0">
                     <a:solidFill>
                       <a:schemeClr val="tx1"/>
                     </a:solidFill>
@@ -3734,7 +3583,7 @@
                   <a:t>распылённые</a:t>
                 </a:r>
                 <a:r>
-                  <a:rPr lang="en-US" sz="2800" dirty="0" smtClean="0">
+                  <a:rPr lang="en-US" sz="2800" dirty="0">
                     <a:solidFill>
                       <a:schemeClr val="tx1"/>
                     </a:solidFill>
@@ -3744,7 +3593,7 @@
                   <a:t>)</a:t>
                 </a:r>
                 <a:r>
-                  <a:rPr lang="ru-RU" sz="2800" dirty="0" smtClean="0">
+                  <a:rPr lang="ru-RU" sz="2800" dirty="0">
                     <a:solidFill>
                       <a:schemeClr val="tx1"/>
                     </a:solidFill>
@@ -3754,7 +3603,7 @@
                   <a:t> частицы, а </a:t>
                 </a:r>
                 <a:r>
-                  <a:rPr lang="el-GR" sz="2800" dirty="0" smtClean="0">
+                  <a:rPr lang="el-GR" sz="2800" dirty="0">
                     <a:solidFill>
                       <a:schemeClr val="tx1"/>
                     </a:solidFill>
@@ -3764,7 +3613,7 @@
                   <a:t>θ</a:t>
                 </a:r>
                 <a:r>
-                  <a:rPr lang="en-US" sz="2800" dirty="0" smtClean="0">
+                  <a:rPr lang="en-US" sz="2800" dirty="0">
                     <a:solidFill>
                       <a:schemeClr val="tx1"/>
                     </a:solidFill>
@@ -3774,7 +3623,7 @@
                   <a:t>&gt;180 – </a:t>
                 </a:r>
                 <a:r>
-                  <a:rPr lang="ru-RU" sz="2800" dirty="0" smtClean="0">
+                  <a:rPr lang="ru-RU" sz="2800" dirty="0">
                     <a:solidFill>
                       <a:schemeClr val="tx1"/>
                     </a:solidFill>
@@ -3784,7 +3633,7 @@
                   <a:t>внедрённые. Также необходимо поставить галочки напротив </a:t>
                 </a:r>
                 <a:r>
-                  <a:rPr lang="en-US" sz="2800" dirty="0" smtClean="0">
+                  <a:rPr lang="en-US" sz="2800" dirty="0">
                     <a:solidFill>
                       <a:schemeClr val="tx1"/>
                     </a:solidFill>
@@ -3794,7 +3643,7 @@
                   <a:t>N(</a:t>
                 </a:r>
                 <a:r>
-                  <a:rPr lang="el-GR" sz="2800" dirty="0" smtClean="0">
+                  <a:rPr lang="el-GR" sz="2800" dirty="0">
                     <a:solidFill>
                       <a:schemeClr val="tx1"/>
                     </a:solidFill>
@@ -3804,7 +3653,7 @@
                   <a:t>θ</a:t>
                 </a:r>
                 <a:r>
-                  <a:rPr lang="en-US" sz="2800" dirty="0" smtClean="0">
+                  <a:rPr lang="en-US" sz="2800" dirty="0">
                     <a:solidFill>
                       <a:schemeClr val="tx1"/>
                     </a:solidFill>
@@ -3814,7 +3663,7 @@
                   <a:t>)</a:t>
                 </a:r>
                 <a:r>
-                  <a:rPr lang="ru-RU" sz="2800" dirty="0" smtClean="0">
+                  <a:rPr lang="ru-RU" sz="2800" dirty="0">
                     <a:solidFill>
                       <a:schemeClr val="tx1"/>
                     </a:solidFill>
@@ -3829,27 +3678,17 @@
                   <a:buAutoNum type="arabicParenR"/>
                 </a:pPr>
                 <a:r>
-                  <a:rPr lang="ru-RU" sz="2800" dirty="0" smtClean="0">
-                    <a:solidFill>
-                      <a:schemeClr val="tx1"/>
-                    </a:solidFill>
-                    <a:latin typeface="Times New Roman" panose="02020603050405020304" pitchFamily="18" charset="0"/>
-                    <a:cs typeface="Times New Roman" panose="02020603050405020304" pitchFamily="18" charset="0"/>
-                  </a:rPr>
-                  <a:t>Распределение частиц по всем углам. В этом случае необходимо задать шаги по </a:t>
-                </a:r>
-                <a:r>
-                  <a:rPr lang="ru-RU" sz="2800" dirty="0" smtClean="0">
-                    <a:solidFill>
-                      <a:schemeClr val="tx1"/>
-                    </a:solidFill>
-                    <a:latin typeface="Times New Roman" panose="02020603050405020304" pitchFamily="18" charset="0"/>
-                    <a:cs typeface="Times New Roman" panose="02020603050405020304" pitchFamily="18" charset="0"/>
-                  </a:rPr>
-                  <a:t>углам </a:t>
-                </a:r>
-                <a:r>
-                  <a:rPr lang="en-US" sz="2800" dirty="0" smtClean="0">
+                  <a:rPr lang="ru-RU" sz="2800" dirty="0">
+                    <a:solidFill>
+                      <a:schemeClr val="tx1"/>
+                    </a:solidFill>
+                    <a:latin typeface="Times New Roman" panose="02020603050405020304" pitchFamily="18" charset="0"/>
+                    <a:cs typeface="Times New Roman" panose="02020603050405020304" pitchFamily="18" charset="0"/>
+                  </a:rPr>
+                  <a:t>Распределение частиц по всем углам. В этом случае необходимо задать шаги по углам </a:t>
+                </a:r>
+                <a:r>
+                  <a:rPr lang="en-US" sz="2800" dirty="0">
                     <a:solidFill>
                       <a:schemeClr val="tx1"/>
                     </a:solidFill>
@@ -3859,7 +3698,7 @@
                   <a:t>d</a:t>
                 </a:r>
                 <a:r>
-                  <a:rPr lang="el-GR" sz="2800" dirty="0" smtClean="0">
+                  <a:rPr lang="el-GR" sz="2800" dirty="0">
                     <a:solidFill>
                       <a:schemeClr val="tx1"/>
                     </a:solidFill>
@@ -3869,7 +3708,7 @@
                   <a:t>φ</a:t>
                 </a:r>
                 <a:r>
-                  <a:rPr lang="en-US" sz="2800" dirty="0" smtClean="0">
+                  <a:rPr lang="en-US" sz="2800" dirty="0">
                     <a:solidFill>
                       <a:schemeClr val="tx1"/>
                     </a:solidFill>
@@ -3879,7 +3718,7 @@
                   <a:t> </a:t>
                 </a:r>
                 <a:r>
-                  <a:rPr lang="ru-RU" sz="2800" dirty="0" smtClean="0">
+                  <a:rPr lang="ru-RU" sz="2800" dirty="0">
                     <a:solidFill>
                       <a:schemeClr val="tx1"/>
                     </a:solidFill>
@@ -3889,7 +3728,7 @@
                   <a:t>и </a:t>
                 </a:r>
                 <a:r>
-                  <a:rPr lang="en-US" sz="2800" dirty="0" smtClean="0">
+                  <a:rPr lang="en-US" sz="2800" dirty="0">
                     <a:solidFill>
                       <a:schemeClr val="tx1"/>
                     </a:solidFill>
@@ -3899,7 +3738,7 @@
                   <a:t>d</a:t>
                 </a:r>
                 <a:r>
-                  <a:rPr lang="el-GR" sz="2800" dirty="0" smtClean="0">
+                  <a:rPr lang="el-GR" sz="2800" dirty="0">
                     <a:solidFill>
                       <a:schemeClr val="tx1"/>
                     </a:solidFill>
@@ -3909,7 +3748,7 @@
                   <a:t>θ</a:t>
                 </a:r>
                 <a:r>
-                  <a:rPr lang="en-US" sz="2800" dirty="0" smtClean="0">
+                  <a:rPr lang="en-US" sz="2800" dirty="0">
                     <a:solidFill>
                       <a:schemeClr val="tx1"/>
                     </a:solidFill>
@@ -3919,7 +3758,7 @@
                   <a:t> </a:t>
                 </a:r>
                 <a:r>
-                  <a:rPr lang="ru-RU" sz="2800" dirty="0" smtClean="0">
+                  <a:rPr lang="ru-RU" sz="2800" dirty="0">
                     <a:solidFill>
                       <a:schemeClr val="tx1"/>
                     </a:solidFill>
@@ -3932,27 +3771,17 @@
               <a:p>
                 <a:pPr algn="just"/>
                 <a:r>
-                  <a:rPr lang="ru-RU" sz="2800" dirty="0" smtClean="0">
-                    <a:solidFill>
-                      <a:schemeClr val="tx1"/>
-                    </a:solidFill>
-                    <a:latin typeface="Times New Roman" panose="02020603050405020304" pitchFamily="18" charset="0"/>
-                    <a:cs typeface="Times New Roman" panose="02020603050405020304" pitchFamily="18" charset="0"/>
-                  </a:rPr>
-                  <a:t>       Все </a:t>
-                </a:r>
-                <a:r>
-                  <a:rPr lang="ru-RU" sz="2800" dirty="0" smtClean="0">
-                    <a:solidFill>
-                      <a:schemeClr val="tx1"/>
-                    </a:solidFill>
-                    <a:latin typeface="Times New Roman" panose="02020603050405020304" pitchFamily="18" charset="0"/>
-                    <a:cs typeface="Times New Roman" panose="02020603050405020304" pitchFamily="18" charset="0"/>
-                  </a:rPr>
-                  <a:t>зависимости будут представлены графически, а также записаны в текстовые файлы в директории исходного файла. Время расчёта можно увеличить, подбирая эффективное значение </a:t>
-                </a:r>
-                <a:r>
-                  <a:rPr lang="en-US" sz="2800" dirty="0" err="1" smtClean="0">
+                  <a:rPr lang="ru-RU" sz="2800" dirty="0">
+                    <a:solidFill>
+                      <a:schemeClr val="tx1"/>
+                    </a:solidFill>
+                    <a:latin typeface="Times New Roman" panose="02020603050405020304" pitchFamily="18" charset="0"/>
+                    <a:cs typeface="Times New Roman" panose="02020603050405020304" pitchFamily="18" charset="0"/>
+                  </a:rPr>
+                  <a:t>       Все зависимости будут представлены графически, а также записаны в текстовые файлы в директории исходного файла. Время расчёта можно увеличить, подбирая эффективное значение </a:t>
+                </a:r>
+                <a:r>
+                  <a:rPr lang="en-US" sz="2800" dirty="0" err="1">
                     <a:solidFill>
                       <a:schemeClr val="tx1"/>
                     </a:solidFill>
@@ -3962,7 +3791,7 @@
                   <a:t>StringCount</a:t>
                 </a:r>
                 <a:r>
-                  <a:rPr lang="ru-RU" sz="2800" dirty="0" smtClean="0">
+                  <a:rPr lang="ru-RU" sz="2800" dirty="0">
                     <a:solidFill>
                       <a:schemeClr val="tx1"/>
                     </a:solidFill>
@@ -3971,13 +3800,6 @@
                   </a:rPr>
                   <a:t>. </a:t>
                 </a:r>
-                <a:endParaRPr lang="ru-RU" sz="2800" dirty="0" smtClean="0">
-                  <a:solidFill>
-                    <a:schemeClr val="tx1"/>
-                  </a:solidFill>
-                  <a:latin typeface="Times New Roman" panose="02020603050405020304" pitchFamily="18" charset="0"/>
-                  <a:cs typeface="Times New Roman" panose="02020603050405020304" pitchFamily="18" charset="0"/>
-                </a:endParaRPr>
               </a:p>
               <a:p>
                 <a:pPr algn="just"/>
@@ -3989,129 +3811,79 @@
                     <a:latin typeface="Times New Roman" panose="02020603050405020304" pitchFamily="18" charset="0"/>
                     <a:cs typeface="Times New Roman" panose="02020603050405020304" pitchFamily="18" charset="0"/>
                   </a:rPr>
+                  <a:t>      Также в окне «коэффициенты» представлено количество проанализированных частиц, коэффициент рассеяния, распыления, внедрения и рассеяния энергии. Первые три рассчитываются как отношение количества рассеянных/распылённых/внедрённых частиц к полному числу запущенных частиц (ЧЗЧ). ЧЗЧ определяется следующим образом: если в графе </a:t>
+                </a:r>
+                <a:r>
+                  <a:rPr lang="en-US" sz="2800" dirty="0">
+                    <a:solidFill>
+                      <a:schemeClr val="tx1"/>
+                    </a:solidFill>
+                    <a:latin typeface="Times New Roman" panose="02020603050405020304" pitchFamily="18" charset="0"/>
+                    <a:cs typeface="Times New Roman" panose="02020603050405020304" pitchFamily="18" charset="0"/>
+                  </a:rPr>
+                  <a:t>“</a:t>
+                </a:r>
+                <a:r>
+                  <a:rPr lang="ru-RU" sz="2800" dirty="0">
+                    <a:solidFill>
+                      <a:schemeClr val="tx1"/>
+                    </a:solidFill>
+                    <a:latin typeface="Times New Roman" panose="02020603050405020304" pitchFamily="18" charset="0"/>
+                    <a:cs typeface="Times New Roman" panose="02020603050405020304" pitchFamily="18" charset="0"/>
+                  </a:rPr>
+                  <a:t>число запущенных частиц</a:t>
+                </a:r>
+                <a:r>
+                  <a:rPr lang="en-US" sz="2800" dirty="0">
+                    <a:solidFill>
+                      <a:schemeClr val="tx1"/>
+                    </a:solidFill>
+                    <a:latin typeface="Times New Roman" panose="02020603050405020304" pitchFamily="18" charset="0"/>
+                    <a:cs typeface="Times New Roman" panose="02020603050405020304" pitchFamily="18" charset="0"/>
+                  </a:rPr>
+                  <a:t>”</a:t>
+                </a:r>
+                <a:r>
+                  <a:rPr lang="ru-RU" sz="2800" dirty="0">
+                    <a:solidFill>
+                      <a:schemeClr val="tx1"/>
+                    </a:solidFill>
+                    <a:latin typeface="Times New Roman" panose="02020603050405020304" pitchFamily="18" charset="0"/>
+                    <a:cs typeface="Times New Roman" panose="02020603050405020304" pitchFamily="18" charset="0"/>
+                  </a:rPr>
+                  <a:t> в левом нижнем углу указано значение </a:t>
+                </a:r>
+                <a:r>
+                  <a:rPr lang="en-US" sz="2800" dirty="0">
+                    <a:solidFill>
+                      <a:schemeClr val="tx1"/>
+                    </a:solidFill>
+                    <a:latin typeface="Times New Roman" panose="02020603050405020304" pitchFamily="18" charset="0"/>
+                    <a:cs typeface="Times New Roman" panose="02020603050405020304" pitchFamily="18" charset="0"/>
+                  </a:rPr>
+                  <a:t>&gt;10</a:t>
+                </a:r>
+                <a:r>
+                  <a:rPr lang="ru-RU" sz="2800" dirty="0">
+                    <a:solidFill>
+                      <a:schemeClr val="tx1"/>
+                    </a:solidFill>
+                    <a:latin typeface="Times New Roman" panose="02020603050405020304" pitchFamily="18" charset="0"/>
+                    <a:cs typeface="Times New Roman" panose="02020603050405020304" pitchFamily="18" charset="0"/>
+                  </a:rPr>
+                  <a:t>,</a:t>
+                </a:r>
+                <a:r>
+                  <a:rPr lang="en-US" sz="2800" dirty="0">
+                    <a:solidFill>
+                      <a:schemeClr val="tx1"/>
+                    </a:solidFill>
+                    <a:latin typeface="Times New Roman" panose="02020603050405020304" pitchFamily="18" charset="0"/>
+                    <a:cs typeface="Times New Roman" panose="02020603050405020304" pitchFamily="18" charset="0"/>
+                  </a:rPr>
                   <a:t> </a:t>
                 </a:r>
                 <a:r>
-                  <a:rPr lang="ru-RU" sz="2800" dirty="0" smtClean="0">
-                    <a:solidFill>
-                      <a:schemeClr val="tx1"/>
-                    </a:solidFill>
-                    <a:latin typeface="Times New Roman" panose="02020603050405020304" pitchFamily="18" charset="0"/>
-                    <a:cs typeface="Times New Roman" panose="02020603050405020304" pitchFamily="18" charset="0"/>
-                  </a:rPr>
-                  <a:t>     </a:t>
-                </a:r>
-                <a:r>
-                  <a:rPr lang="ru-RU" sz="2800" dirty="0" smtClean="0">
-                    <a:solidFill>
-                      <a:schemeClr val="tx1"/>
-                    </a:solidFill>
-                    <a:latin typeface="Times New Roman" panose="02020603050405020304" pitchFamily="18" charset="0"/>
-                    <a:cs typeface="Times New Roman" panose="02020603050405020304" pitchFamily="18" charset="0"/>
-                  </a:rPr>
-                  <a:t>Также </a:t>
-                </a:r>
-                <a:r>
-                  <a:rPr lang="ru-RU" sz="2800" dirty="0" smtClean="0">
-                    <a:solidFill>
-                      <a:schemeClr val="tx1"/>
-                    </a:solidFill>
-                    <a:latin typeface="Times New Roman" panose="02020603050405020304" pitchFamily="18" charset="0"/>
-                    <a:cs typeface="Times New Roman" panose="02020603050405020304" pitchFamily="18" charset="0"/>
-                  </a:rPr>
-                  <a:t>в окне «коэффициенты» представлено количество проанализированных частиц, коэффициент рассеяния, распыления, внедрения и рассеяния энергии. Первые три рассчитываются как отношение количества рассеянных/распылённых/внедрённых частиц к полному числу запущенных </a:t>
-                </a:r>
-                <a:r>
-                  <a:rPr lang="ru-RU" sz="2800" dirty="0" smtClean="0">
-                    <a:solidFill>
-                      <a:schemeClr val="tx1"/>
-                    </a:solidFill>
-                    <a:latin typeface="Times New Roman" panose="02020603050405020304" pitchFamily="18" charset="0"/>
-                    <a:cs typeface="Times New Roman" panose="02020603050405020304" pitchFamily="18" charset="0"/>
-                  </a:rPr>
-                  <a:t>частиц (</a:t>
-                </a:r>
-                <a:r>
-                  <a:rPr lang="ru-RU" sz="2800" dirty="0" smtClean="0">
-                    <a:solidFill>
-                      <a:schemeClr val="tx1"/>
-                    </a:solidFill>
-                    <a:latin typeface="Times New Roman" panose="02020603050405020304" pitchFamily="18" charset="0"/>
-                    <a:cs typeface="Times New Roman" panose="02020603050405020304" pitchFamily="18" charset="0"/>
-                  </a:rPr>
-                  <a:t>ЧЗЧ). ЧЗЧ определяется следующим образом: если в </a:t>
-                </a:r>
-                <a:r>
-                  <a:rPr lang="ru-RU" sz="2800" dirty="0" smtClean="0">
-                    <a:solidFill>
-                      <a:schemeClr val="tx1"/>
-                    </a:solidFill>
-                    <a:latin typeface="Times New Roman" panose="02020603050405020304" pitchFamily="18" charset="0"/>
-                    <a:cs typeface="Times New Roman" panose="02020603050405020304" pitchFamily="18" charset="0"/>
-                  </a:rPr>
-                  <a:t>графе </a:t>
-                </a:r>
-                <a:r>
-                  <a:rPr lang="en-US" sz="2800" dirty="0" smtClean="0">
-                    <a:solidFill>
-                      <a:schemeClr val="tx1"/>
-                    </a:solidFill>
-                    <a:latin typeface="Times New Roman" panose="02020603050405020304" pitchFamily="18" charset="0"/>
-                    <a:cs typeface="Times New Roman" panose="02020603050405020304" pitchFamily="18" charset="0"/>
-                  </a:rPr>
-                  <a:t>“</a:t>
-                </a:r>
-                <a:r>
-                  <a:rPr lang="ru-RU" sz="2800" dirty="0" smtClean="0">
-                    <a:solidFill>
-                      <a:schemeClr val="tx1"/>
-                    </a:solidFill>
-                    <a:latin typeface="Times New Roman" panose="02020603050405020304" pitchFamily="18" charset="0"/>
-                    <a:cs typeface="Times New Roman" panose="02020603050405020304" pitchFamily="18" charset="0"/>
-                  </a:rPr>
-                  <a:t>число запущенных частиц</a:t>
-                </a:r>
-                <a:r>
-                  <a:rPr lang="en-US" sz="2800" dirty="0" smtClean="0">
-                    <a:solidFill>
-                      <a:schemeClr val="tx1"/>
-                    </a:solidFill>
-                    <a:latin typeface="Times New Roman" panose="02020603050405020304" pitchFamily="18" charset="0"/>
-                    <a:cs typeface="Times New Roman" panose="02020603050405020304" pitchFamily="18" charset="0"/>
-                  </a:rPr>
-                  <a:t>”</a:t>
-                </a:r>
-                <a:r>
-                  <a:rPr lang="ru-RU" sz="2800" dirty="0" smtClean="0">
-                    <a:solidFill>
-                      <a:schemeClr val="tx1"/>
-                    </a:solidFill>
-                    <a:latin typeface="Times New Roman" panose="02020603050405020304" pitchFamily="18" charset="0"/>
-                    <a:cs typeface="Times New Roman" panose="02020603050405020304" pitchFamily="18" charset="0"/>
-                  </a:rPr>
-                  <a:t> </a:t>
-                </a:r>
-                <a:r>
-                  <a:rPr lang="ru-RU" sz="2800" dirty="0" smtClean="0">
-                    <a:solidFill>
-                      <a:schemeClr val="tx1"/>
-                    </a:solidFill>
-                    <a:latin typeface="Times New Roman" panose="02020603050405020304" pitchFamily="18" charset="0"/>
-                    <a:cs typeface="Times New Roman" panose="02020603050405020304" pitchFamily="18" charset="0"/>
-                  </a:rPr>
-                  <a:t>в левом нижнем углу указано значение </a:t>
-                </a:r>
-                <a:r>
-                  <a:rPr lang="en-US" sz="2800" dirty="0" smtClean="0">
-                    <a:solidFill>
-                      <a:schemeClr val="tx1"/>
-                    </a:solidFill>
-                    <a:latin typeface="Times New Roman" panose="02020603050405020304" pitchFamily="18" charset="0"/>
-                    <a:cs typeface="Times New Roman" panose="02020603050405020304" pitchFamily="18" charset="0"/>
-                  </a:rPr>
-                  <a:t>&gt;10</a:t>
-                </a:r>
-                <a:r>
                   <a:rPr lang="ru-RU" sz="2800" dirty="0">
                     <a:solidFill>
                       <a:schemeClr val="tx1"/>
@@ -4119,30 +3891,10 @@
                     <a:latin typeface="Times New Roman" panose="02020603050405020304" pitchFamily="18" charset="0"/>
                     <a:cs typeface="Times New Roman" panose="02020603050405020304" pitchFamily="18" charset="0"/>
                   </a:rPr>
-                  <a:t>,</a:t>
-                </a:r>
-                <a:r>
-                  <a:rPr lang="en-US" sz="2800" dirty="0" smtClean="0">
-                    <a:solidFill>
-                      <a:schemeClr val="tx1"/>
-                    </a:solidFill>
-                    <a:latin typeface="Times New Roman" panose="02020603050405020304" pitchFamily="18" charset="0"/>
-                    <a:cs typeface="Times New Roman" panose="02020603050405020304" pitchFamily="18" charset="0"/>
-                  </a:rPr>
-                  <a:t> </a:t>
-                </a:r>
-                <a:r>
-                  <a:rPr lang="ru-RU" sz="2800" dirty="0" smtClean="0">
-                    <a:solidFill>
-                      <a:schemeClr val="tx1"/>
-                    </a:solidFill>
-                    <a:latin typeface="Times New Roman" panose="02020603050405020304" pitchFamily="18" charset="0"/>
-                    <a:cs typeface="Times New Roman" panose="02020603050405020304" pitchFamily="18" charset="0"/>
-                  </a:rPr>
                   <a:t>то оно берётся в качестве ЧЗЧ, иначе в случае </a:t>
                 </a:r>
                 <a:r>
-                  <a:rPr lang="en-US" sz="2800" dirty="0" smtClean="0">
+                  <a:rPr lang="en-US" sz="2800" dirty="0">
                     <a:solidFill>
                       <a:schemeClr val="tx1"/>
                     </a:solidFill>
@@ -4152,7 +3904,7 @@
                   <a:t>TRIM </a:t>
                 </a:r>
                 <a:r>
-                  <a:rPr lang="ru-RU" sz="2800" dirty="0" smtClean="0">
+                  <a:rPr lang="ru-RU" sz="2800" dirty="0">
                     <a:solidFill>
                       <a:schemeClr val="tx1"/>
                     </a:solidFill>
@@ -4162,7 +3914,7 @@
                   <a:t>берётся количество проанализированных частиц (что будет некорректно, если анализируется файл, содержащий только один сорт частиц, например, </a:t>
                 </a:r>
                 <a:r>
-                  <a:rPr lang="en-US" sz="2800" dirty="0" smtClean="0">
+                  <a:rPr lang="en-US" sz="2800" dirty="0">
                     <a:solidFill>
                       <a:schemeClr val="tx1"/>
                     </a:solidFill>
@@ -4172,7 +3924,7 @@
                   <a:t>BACKSCAT.txt</a:t>
                 </a:r>
                 <a:r>
-                  <a:rPr lang="ru-RU" sz="2800" dirty="0" smtClean="0">
+                  <a:rPr lang="ru-RU" sz="2800" dirty="0">
                     <a:solidFill>
                       <a:schemeClr val="tx1"/>
                     </a:solidFill>
@@ -4182,7 +3934,7 @@
                   <a:t>), в случае </a:t>
                 </a:r>
                 <a:r>
-                  <a:rPr lang="en-US" sz="2800" dirty="0" smtClean="0">
+                  <a:rPr lang="en-US" sz="2800" dirty="0">
                     <a:solidFill>
                       <a:schemeClr val="tx1"/>
                     </a:solidFill>
@@ -4192,7 +3944,7 @@
                   <a:t>SCATTER </a:t>
                 </a:r>
                 <a:r>
-                  <a:rPr lang="ru-RU" sz="2800" dirty="0" smtClean="0">
+                  <a:rPr lang="ru-RU" sz="2800" dirty="0">
                     <a:solidFill>
                       <a:schemeClr val="tx1"/>
                     </a:solidFill>
@@ -4243,7 +3995,7 @@
                   </m:oMath>
                 </a14:m>
                 <a:r>
-                  <a:rPr lang="ru-RU" sz="2800" dirty="0" smtClean="0">
+                  <a:rPr lang="ru-RU" sz="2800" dirty="0">
                     <a:solidFill>
                       <a:schemeClr val="tx1"/>
                     </a:solidFill>
@@ -4253,7 +4005,7 @@
                   <a:t>(</a:t>
                 </a:r>
                 <a:r>
-                  <a:rPr lang="en-US" sz="2800" i="1" dirty="0" smtClean="0">
+                  <a:rPr lang="en-US" sz="2800" i="1" dirty="0">
                     <a:solidFill>
                       <a:schemeClr val="tx1"/>
                     </a:solidFill>
@@ -4263,7 +4015,7 @@
                   <a:t>x</a:t>
                 </a:r>
                 <a:r>
-                  <a:rPr lang="en-US" sz="2800" dirty="0" smtClean="0">
+                  <a:rPr lang="en-US" sz="2800" dirty="0">
                     <a:solidFill>
                       <a:schemeClr val="tx1"/>
                     </a:solidFill>
@@ -4273,7 +4025,7 @@
                   <a:t> - </a:t>
                 </a:r>
                 <a:r>
-                  <a:rPr lang="ru-RU" sz="2800" dirty="0" smtClean="0">
+                  <a:rPr lang="ru-RU" sz="2800" dirty="0">
                     <a:solidFill>
                       <a:schemeClr val="tx1"/>
                     </a:solidFill>
@@ -4283,7 +4035,7 @@
                   <a:t>целое)</a:t>
                 </a:r>
                 <a:r>
-                  <a:rPr lang="en-US" sz="2800" dirty="0" smtClean="0">
+                  <a:rPr lang="en-US" sz="2800" dirty="0">
                     <a:solidFill>
                       <a:schemeClr val="tx1"/>
                     </a:solidFill>
@@ -4293,16 +4045,6 @@
                   <a:t>, </a:t>
                 </a:r>
                 <a:r>
-                  <a:rPr lang="ru-RU" sz="2800" dirty="0" smtClean="0">
-                    <a:solidFill>
-                      <a:schemeClr val="tx1"/>
-                    </a:solidFill>
-                    <a:latin typeface="Times New Roman" panose="02020603050405020304" pitchFamily="18" charset="0"/>
-                    <a:cs typeface="Times New Roman" panose="02020603050405020304" pitchFamily="18" charset="0"/>
-                  </a:rPr>
-                  <a:t>большее количества проанализированных частиц.</a:t>
-                </a:r>
-                <a:r>
                   <a:rPr lang="ru-RU" sz="2800" dirty="0">
                     <a:solidFill>
                       <a:schemeClr val="tx1"/>
@@ -4310,20 +4052,10 @@
                     <a:latin typeface="Times New Roman" panose="02020603050405020304" pitchFamily="18" charset="0"/>
                     <a:cs typeface="Times New Roman" panose="02020603050405020304" pitchFamily="18" charset="0"/>
                   </a:rPr>
-                  <a:t> </a:t>
-                </a:r>
-                <a:r>
-                  <a:rPr lang="ru-RU" sz="2800" dirty="0" smtClean="0">
-                    <a:solidFill>
-                      <a:schemeClr val="tx1"/>
-                    </a:solidFill>
-                    <a:latin typeface="Times New Roman" panose="02020603050405020304" pitchFamily="18" charset="0"/>
-                    <a:cs typeface="Times New Roman" panose="02020603050405020304" pitchFamily="18" charset="0"/>
-                  </a:rPr>
-                  <a:t>Таким образом, в случае </a:t>
-                </a:r>
-                <a:r>
-                  <a:rPr lang="en-US" sz="2800" dirty="0" smtClean="0">
+                  <a:t>большее количества проанализированных частиц. Таким образом, в случае </a:t>
+                </a:r>
+                <a:r>
+                  <a:rPr lang="en-US" sz="2800" dirty="0">
                     <a:solidFill>
                       <a:schemeClr val="tx1"/>
                     </a:solidFill>
@@ -4333,7 +4065,7 @@
                   <a:t>SCATTER </a:t>
                 </a:r>
                 <a:r>
-                  <a:rPr lang="ru-RU" sz="2800" dirty="0" smtClean="0">
+                  <a:rPr lang="ru-RU" sz="2800" dirty="0">
                     <a:solidFill>
                       <a:schemeClr val="tx1"/>
                     </a:solidFill>
@@ -4345,7 +4077,7 @@
               </a:p>
               <a:p>
                 <a:pPr algn="just"/>
-                <a:endParaRPr lang="ru-RU" sz="1400" dirty="0" smtClean="0">
+                <a:endParaRPr lang="ru-RU" sz="1400" dirty="0">
                   <a:solidFill>
                     <a:schemeClr val="tx1"/>
                   </a:solidFill>
@@ -4356,7 +4088,7 @@
             </p:txBody>
           </p:sp>
         </mc:Choice>
-        <mc:Fallback>
+        <mc:Fallback xmlns="">
           <p:sp>
             <p:nvSpPr>
               <p:cNvPr id="5" name="Горизонтальный свиток 4"/>
@@ -4419,13 +4151,6 @@
   <p:clrMapOvr>
     <a:masterClrMapping/>
   </p:clrMapOvr>
-  <p:timing>
-    <p:tnLst>
-      <p:par>
-        <p:cTn id="1" dur="indefinite" restart="never" nodeType="tmRoot"/>
-      </p:par>
-    </p:tnLst>
-  </p:timing>
 </p:sld>
 </file>
 
@@ -4448,16 +4173,22 @@
       </p:grpSpPr>
       <p:grpSp>
         <p:nvGrpSpPr>
-          <p:cNvPr id="67" name="Группа 66"/>
+          <p:cNvPr id="2" name="Группа 1">
+            <a:extLst>
+              <a:ext uri="{FF2B5EF4-FFF2-40B4-BE49-F238E27FC236}">
+                <a16:creationId xmlns:a16="http://schemas.microsoft.com/office/drawing/2014/main" id="{E7ECA80E-0F08-4762-BC4B-3D94C4D2E6DF}"/>
+              </a:ext>
+            </a:extLst>
+          </p:cNvPr>
           <p:cNvGrpSpPr/>
           <p:nvPr/>
         </p:nvGrpSpPr>
         <p:grpSpPr>
           <a:xfrm>
-            <a:off x="2111375" y="123997"/>
-            <a:ext cx="8146666" cy="5938137"/>
-            <a:chOff x="1933575" y="225597"/>
-            <a:chExt cx="8146666" cy="5938137"/>
+            <a:off x="2040354" y="499659"/>
+            <a:ext cx="7900073" cy="5653053"/>
+            <a:chOff x="2111375" y="455271"/>
+            <a:chExt cx="7900073" cy="5653053"/>
           </a:xfrm>
         </p:grpSpPr>
         <p:cxnSp>
@@ -4468,7 +4199,7 @@
           </p:nvCxnSpPr>
           <p:spPr>
             <a:xfrm flipV="1">
-              <a:off x="1933575" y="3358092"/>
+              <a:off x="2111375" y="3256492"/>
               <a:ext cx="3805237" cy="15876"/>
             </a:xfrm>
             <a:prstGeom prst="line">
@@ -4504,7 +4235,7 @@
           </p:nvCxnSpPr>
           <p:spPr>
             <a:xfrm flipV="1">
-              <a:off x="5738812" y="3342216"/>
+              <a:off x="5916612" y="3240616"/>
               <a:ext cx="3805237" cy="15876"/>
             </a:xfrm>
             <a:prstGeom prst="line">
@@ -4540,7 +4271,7 @@
           </p:nvCxnSpPr>
           <p:spPr>
             <a:xfrm>
-              <a:off x="5645679" y="568326"/>
+              <a:off x="5868179" y="3231936"/>
               <a:ext cx="18521" cy="2805642"/>
             </a:xfrm>
             <a:prstGeom prst="line">
@@ -4576,7 +4307,7 @@
           </p:nvCxnSpPr>
           <p:spPr>
             <a:xfrm>
-              <a:off x="5679811" y="3358092"/>
+              <a:off x="5857578" y="458788"/>
               <a:ext cx="5291" cy="2805642"/>
             </a:xfrm>
             <a:prstGeom prst="line">
@@ -4612,7 +4343,7 @@
           </p:nvGrpSpPr>
           <p:grpSpPr>
             <a:xfrm>
-              <a:off x="3474507" y="746924"/>
+              <a:off x="3652307" y="645324"/>
               <a:ext cx="4636030" cy="5017557"/>
               <a:chOff x="3526763" y="1009391"/>
               <a:chExt cx="4636030" cy="5017557"/>
@@ -4697,8 +4428,8 @@
             <p:nvPr/>
           </p:nvSpPr>
           <p:spPr>
-            <a:xfrm>
-              <a:off x="5577945" y="433623"/>
+            <a:xfrm rot="10800000">
+              <a:off x="5812728" y="5838919"/>
               <a:ext cx="135467" cy="269405"/>
             </a:xfrm>
             <a:prstGeom prst="flowChartExtract">
@@ -4746,7 +4477,7 @@
           </p:nvSpPr>
           <p:spPr>
             <a:xfrm rot="2292888">
-              <a:off x="8028358" y="566547"/>
+              <a:off x="8206158" y="464947"/>
               <a:ext cx="164357" cy="288462"/>
             </a:xfrm>
             <a:prstGeom prst="flowChartExtract">
@@ -4794,7 +4525,7 @@
           </p:nvSpPr>
           <p:spPr>
             <a:xfrm rot="5400000">
-              <a:off x="9568871" y="3174721"/>
+              <a:off x="9746671" y="3073121"/>
               <a:ext cx="178689" cy="350865"/>
             </a:xfrm>
             <a:prstGeom prst="flowChartExtract">
@@ -4842,7 +4573,7 @@
           </p:nvSpPr>
           <p:spPr>
             <a:xfrm>
-              <a:off x="9160162" y="2750757"/>
+              <a:off x="5748866" y="5378059"/>
               <a:ext cx="694267" cy="550755"/>
             </a:xfrm>
             <a:prstGeom prst="rect">
@@ -4912,7 +4643,7 @@
           </p:nvSpPr>
           <p:spPr>
             <a:xfrm>
-              <a:off x="7956746" y="568325"/>
+              <a:off x="8134546" y="466725"/>
               <a:ext cx="694267" cy="550755"/>
             </a:xfrm>
             <a:prstGeom prst="rect">
@@ -4945,7 +4676,7 @@
             <a:p>
               <a:pPr algn="ctr"/>
               <a:r>
-                <a:rPr lang="en-US" sz="2400" b="1" dirty="0" smtClean="0">
+                <a:rPr lang="en-US" sz="2400" b="1" dirty="0">
                   <a:solidFill>
                     <a:sysClr val="windowText" lastClr="000000"/>
                   </a:solidFill>
@@ -4982,7 +4713,7 @@
           </p:nvSpPr>
           <p:spPr>
             <a:xfrm>
-              <a:off x="5059494" y="225597"/>
+              <a:off x="9172381" y="2701030"/>
               <a:ext cx="694267" cy="550755"/>
             </a:xfrm>
             <a:prstGeom prst="rect">
@@ -5052,7 +4783,7 @@
           </p:nvCxnSpPr>
           <p:spPr>
             <a:xfrm flipV="1">
-              <a:off x="5679811" y="568325"/>
+              <a:off x="5875367" y="466725"/>
               <a:ext cx="1264641" cy="2773891"/>
             </a:xfrm>
             <a:prstGeom prst="line">
@@ -5088,7 +4819,7 @@
           </p:nvCxnSpPr>
           <p:spPr>
             <a:xfrm flipH="1" flipV="1">
-              <a:off x="3252786" y="754288"/>
+              <a:off x="3430586" y="652688"/>
               <a:ext cx="2411414" cy="2619680"/>
             </a:xfrm>
             <a:prstGeom prst="line">
@@ -5124,7 +4855,7 @@
           </p:nvSpPr>
           <p:spPr>
             <a:xfrm rot="8214100">
-              <a:off x="4175379" y="1668214"/>
+              <a:off x="4353179" y="1566614"/>
               <a:ext cx="250218" cy="473971"/>
             </a:xfrm>
             <a:prstGeom prst="flowChartExtract">
@@ -5172,7 +4903,7 @@
           </p:nvSpPr>
           <p:spPr>
             <a:xfrm rot="1573129">
-              <a:off x="6503275" y="1009634"/>
+              <a:off x="6894140" y="455271"/>
               <a:ext cx="283169" cy="488828"/>
             </a:xfrm>
             <a:prstGeom prst="flowChartExtract">
@@ -5220,7 +4951,7 @@
           </p:nvCxnSpPr>
           <p:spPr>
             <a:xfrm>
-              <a:off x="6967487" y="568326"/>
+              <a:off x="7145287" y="466726"/>
               <a:ext cx="0" cy="2191807"/>
             </a:xfrm>
             <a:prstGeom prst="line">
@@ -5256,7 +4987,7 @@
           </p:nvCxnSpPr>
           <p:spPr>
             <a:xfrm flipH="1">
-              <a:off x="5731935" y="2760133"/>
+              <a:off x="5909735" y="2658533"/>
               <a:ext cx="1235552" cy="605897"/>
             </a:xfrm>
             <a:prstGeom prst="line">
@@ -5292,7 +5023,7 @@
           </p:nvCxnSpPr>
           <p:spPr>
             <a:xfrm flipH="1">
-              <a:off x="5687823" y="608105"/>
+              <a:off x="5865623" y="506505"/>
               <a:ext cx="1235552" cy="605897"/>
             </a:xfrm>
             <a:prstGeom prst="line">
@@ -5328,7 +5059,7 @@
           </p:nvCxnSpPr>
           <p:spPr>
             <a:xfrm flipH="1">
-              <a:off x="6536267" y="2760133"/>
+              <a:off x="6714067" y="2658533"/>
               <a:ext cx="431220" cy="562462"/>
             </a:xfrm>
             <a:prstGeom prst="line">
@@ -5364,7 +5095,7 @@
           </p:nvCxnSpPr>
           <p:spPr>
             <a:xfrm flipH="1" flipV="1">
-              <a:off x="6377799" y="2678727"/>
+              <a:off x="6555599" y="2577127"/>
               <a:ext cx="522846" cy="40703"/>
             </a:xfrm>
             <a:prstGeom prst="line">
@@ -5400,7 +5131,7 @@
           </p:nvSpPr>
           <p:spPr>
             <a:xfrm rot="3794235">
-              <a:off x="6637046" y="2734595"/>
+              <a:off x="6814846" y="2632995"/>
               <a:ext cx="136866" cy="298204"/>
             </a:xfrm>
             <a:prstGeom prst="flowChartExtract">
@@ -5448,61 +5179,12 @@
           </p:nvSpPr>
           <p:spPr>
             <a:xfrm rot="17936238">
-              <a:off x="4663961" y="1700396"/>
+              <a:off x="4841761" y="1598796"/>
               <a:ext cx="1295400" cy="1191496"/>
             </a:xfrm>
             <a:prstGeom prst="arc">
               <a:avLst>
                 <a:gd name="adj1" fmla="val 14237168"/>
-                <a:gd name="adj2" fmla="val 0"/>
-              </a:avLst>
-            </a:prstGeom>
-            <a:ln w="28575">
-              <a:solidFill>
-                <a:schemeClr val="bg2">
-                  <a:lumMod val="75000"/>
-                </a:schemeClr>
-              </a:solidFill>
-              <a:prstDash val="solid"/>
-            </a:ln>
-          </p:spPr>
-          <p:style>
-            <a:lnRef idx="1">
-              <a:schemeClr val="accent1"/>
-            </a:lnRef>
-            <a:fillRef idx="0">
-              <a:schemeClr val="accent1"/>
-            </a:fillRef>
-            <a:effectRef idx="0">
-              <a:schemeClr val="accent1"/>
-            </a:effectRef>
-            <a:fontRef idx="minor">
-              <a:schemeClr val="tx1"/>
-            </a:fontRef>
-          </p:style>
-          <p:txBody>
-            <a:bodyPr rtlCol="0" anchor="ctr"/>
-            <a:lstStyle/>
-            <a:p>
-              <a:pPr algn="ctr"/>
-              <a:endParaRPr lang="ru-RU"/>
-            </a:p>
-          </p:txBody>
-        </p:sp>
-        <p:sp>
-          <p:nvSpPr>
-            <p:cNvPr id="57" name="Дуга 56"/>
-            <p:cNvSpPr/>
-            <p:nvPr/>
-          </p:nvSpPr>
-          <p:spPr>
-            <a:xfrm rot="1233551">
-              <a:off x="4957219" y="2253641"/>
-              <a:ext cx="1295400" cy="1191496"/>
-            </a:xfrm>
-            <a:prstGeom prst="arc">
-              <a:avLst>
-                <a:gd name="adj1" fmla="val 18147507"/>
                 <a:gd name="adj2" fmla="val 0"/>
               </a:avLst>
             </a:prstGeom>
@@ -5546,7 +5228,7 @@
           </p:nvSpPr>
           <p:spPr>
             <a:xfrm rot="1233551">
-              <a:off x="5630841" y="2880667"/>
+              <a:off x="5808641" y="2779067"/>
               <a:ext cx="848672" cy="747459"/>
             </a:xfrm>
             <a:prstGeom prst="arc">
@@ -5595,7 +5277,7 @@
           </p:nvSpPr>
           <p:spPr>
             <a:xfrm>
-              <a:off x="4506692" y="1290512"/>
+              <a:off x="4684492" y="1188912"/>
               <a:ext cx="694267" cy="550755"/>
             </a:xfrm>
             <a:prstGeom prst="rect">
@@ -5628,7 +5310,7 @@
             <a:p>
               <a:pPr algn="ctr"/>
               <a:r>
-                <a:rPr lang="el-GR" sz="2400" b="1" dirty="0" smtClean="0">
+                <a:rPr lang="el-GR" sz="2400" b="1" dirty="0">
                   <a:solidFill>
                     <a:sysClr val="windowText" lastClr="000000"/>
                   </a:solidFill>
@@ -5643,7 +5325,7 @@
                 <a:t>θ</a:t>
               </a:r>
               <a:r>
-                <a:rPr lang="ru-RU" sz="1400" b="1" dirty="0" smtClean="0">
+                <a:rPr lang="ru-RU" sz="1400" b="1" dirty="0">
                   <a:solidFill>
                     <a:sysClr val="windowText" lastClr="000000"/>
                   </a:solidFill>
@@ -5680,7 +5362,7 @@
           </p:nvSpPr>
           <p:spPr>
             <a:xfrm>
-              <a:off x="6168499" y="3019363"/>
+              <a:off x="6346299" y="2917763"/>
               <a:ext cx="346570" cy="369332"/>
             </a:xfrm>
             <a:prstGeom prst="rect">
@@ -5714,46 +5396,57 @@
         </p:sp>
         <p:sp>
           <p:nvSpPr>
-            <p:cNvPr id="63" name="Прямоугольник 62"/>
+            <p:cNvPr id="64" name="Прямоугольник 63"/>
             <p:cNvSpPr/>
             <p:nvPr/>
           </p:nvSpPr>
           <p:spPr>
             <a:xfrm>
-              <a:off x="5929017" y="2189777"/>
-              <a:ext cx="694267" cy="550755"/>
+              <a:off x="7600388" y="1686832"/>
+              <a:ext cx="1717137" cy="1569660"/>
             </a:xfrm>
             <a:prstGeom prst="rect">
               <a:avLst/>
             </a:prstGeom>
-            <a:noFill/>
-            <a:ln>
-              <a:noFill/>
-            </a:ln>
           </p:spPr>
-          <p:style>
-            <a:lnRef idx="2">
-              <a:schemeClr val="accent1">
-                <a:shade val="50000"/>
-              </a:schemeClr>
-            </a:lnRef>
-            <a:fillRef idx="1">
-              <a:schemeClr val="accent1"/>
-            </a:fillRef>
-            <a:effectRef idx="0">
-              <a:schemeClr val="accent1"/>
-            </a:effectRef>
-            <a:fontRef idx="minor">
-              <a:schemeClr val="lt1"/>
-            </a:fontRef>
-          </p:style>
           <p:txBody>
-            <a:bodyPr rtlCol="0" anchor="ctr"/>
+            <a:bodyPr wrap="none">
+              <a:spAutoFit/>
+            </a:bodyPr>
             <a:lstStyle/>
             <a:p>
-              <a:pPr algn="ctr"/>
               <a:r>
-                <a:rPr lang="el-GR" sz="2400" b="1" dirty="0" smtClean="0">
+                <a:rPr lang="ru-RU" sz="3200" b="1" dirty="0">
+                  <a:solidFill>
+                    <a:sysClr val="windowText" lastClr="000000"/>
+                  </a:solidFill>
+                  <a:effectLst>
+                    <a:outerShdw blurRad="38100" dist="38100" dir="2700000" algn="tl">
+                      <a:srgbClr val="000000">
+                        <a:alpha val="43137"/>
+                      </a:srgbClr>
+                    </a:outerShdw>
+                  </a:effectLst>
+                </a:rPr>
+                <a:t>0</a:t>
+              </a:r>
+              <a:r>
+                <a:rPr lang="en-GB" sz="3200" b="1" dirty="0">
+                  <a:solidFill>
+                    <a:sysClr val="windowText" lastClr="000000"/>
+                  </a:solidFill>
+                  <a:effectLst>
+                    <a:outerShdw blurRad="38100" dist="38100" dir="2700000" algn="tl">
+                      <a:srgbClr val="000000">
+                        <a:alpha val="43137"/>
+                      </a:srgbClr>
+                    </a:outerShdw>
+                  </a:effectLst>
+                </a:rPr>
+                <a:t>&lt;</a:t>
+              </a:r>
+              <a:r>
+                <a:rPr lang="el-GR" sz="3200" b="1" dirty="0">
                   <a:solidFill>
                     <a:sysClr val="windowText" lastClr="000000"/>
                   </a:solidFill>
@@ -5767,7 +5460,131 @@
                 </a:rPr>
                 <a:t>θ</a:t>
               </a:r>
-              <a:endParaRPr lang="ru-RU" sz="2400" b="1" dirty="0">
+              <a:r>
+                <a:rPr lang="ru-RU" sz="1800" b="1" dirty="0">
+                  <a:solidFill>
+                    <a:sysClr val="windowText" lastClr="000000"/>
+                  </a:solidFill>
+                  <a:effectLst>
+                    <a:outerShdw blurRad="38100" dist="38100" dir="2700000" algn="tl">
+                      <a:srgbClr val="000000">
+                        <a:alpha val="43137"/>
+                      </a:srgbClr>
+                    </a:outerShdw>
+                  </a:effectLst>
+                </a:rPr>
+                <a:t>0</a:t>
+              </a:r>
+              <a:r>
+                <a:rPr lang="en-US" sz="3200" b="1" dirty="0">
+                  <a:solidFill>
+                    <a:sysClr val="windowText" lastClr="000000"/>
+                  </a:solidFill>
+                  <a:effectLst>
+                    <a:outerShdw blurRad="38100" dist="38100" dir="2700000" algn="tl">
+                      <a:srgbClr val="000000">
+                        <a:alpha val="43137"/>
+                      </a:srgbClr>
+                    </a:outerShdw>
+                  </a:effectLst>
+                </a:rPr>
+                <a:t>&lt;90</a:t>
+              </a:r>
+            </a:p>
+            <a:p>
+              <a:r>
+                <a:rPr lang="en-US" sz="3200" b="1" dirty="0">
+                  <a:solidFill>
+                    <a:sysClr val="windowText" lastClr="000000"/>
+                  </a:solidFill>
+                  <a:effectLst>
+                    <a:outerShdw blurRad="38100" dist="38100" dir="2700000" algn="tl">
+                      <a:srgbClr val="000000">
+                        <a:alpha val="43137"/>
+                      </a:srgbClr>
+                    </a:outerShdw>
+                  </a:effectLst>
+                </a:rPr>
+                <a:t>0&lt;</a:t>
+              </a:r>
+              <a:r>
+                <a:rPr lang="el-GR" sz="3200" b="1" dirty="0">
+                  <a:solidFill>
+                    <a:sysClr val="windowText" lastClr="000000"/>
+                  </a:solidFill>
+                  <a:effectLst>
+                    <a:outerShdw blurRad="38100" dist="38100" dir="2700000" algn="tl">
+                      <a:srgbClr val="000000">
+                        <a:alpha val="43137"/>
+                      </a:srgbClr>
+                    </a:outerShdw>
+                  </a:effectLst>
+                </a:rPr>
+                <a:t>ϕ</a:t>
+              </a:r>
+              <a:r>
+                <a:rPr lang="en-US" sz="3200" b="1" dirty="0">
+                  <a:solidFill>
+                    <a:sysClr val="windowText" lastClr="000000"/>
+                  </a:solidFill>
+                  <a:effectLst>
+                    <a:outerShdw blurRad="38100" dist="38100" dir="2700000" algn="tl">
+                      <a:srgbClr val="000000">
+                        <a:alpha val="43137"/>
+                      </a:srgbClr>
+                    </a:outerShdw>
+                  </a:effectLst>
+                </a:rPr>
+                <a:t>&lt;360</a:t>
+              </a:r>
+            </a:p>
+            <a:p>
+              <a:r>
+                <a:rPr lang="en-US" sz="3200" b="1" dirty="0">
+                  <a:solidFill>
+                    <a:sysClr val="windowText" lastClr="000000"/>
+                  </a:solidFill>
+                  <a:effectLst>
+                    <a:outerShdw blurRad="38100" dist="38100" dir="2700000" algn="tl">
+                      <a:srgbClr val="000000">
+                        <a:alpha val="43137"/>
+                      </a:srgbClr>
+                    </a:outerShdw>
+                  </a:effectLst>
+                </a:rPr>
+                <a:t>0&lt;</a:t>
+              </a:r>
+              <a:r>
+                <a:rPr lang="el-GR" sz="3200" b="1" dirty="0">
+                  <a:solidFill>
+                    <a:sysClr val="windowText" lastClr="000000"/>
+                  </a:solidFill>
+                  <a:effectLst>
+                    <a:outerShdw blurRad="38100" dist="38100" dir="2700000" algn="tl">
+                      <a:srgbClr val="000000">
+                        <a:alpha val="43137"/>
+                      </a:srgbClr>
+                    </a:outerShdw>
+                  </a:effectLst>
+                </a:rPr>
+                <a:t>θ</a:t>
+              </a:r>
+              <a:r>
+                <a:rPr lang="en-US" sz="3200" b="1" dirty="0">
+                  <a:solidFill>
+                    <a:sysClr val="windowText" lastClr="000000"/>
+                  </a:solidFill>
+                  <a:effectLst>
+                    <a:outerShdw blurRad="38100" dist="38100" dir="2700000" algn="tl">
+                      <a:srgbClr val="000000">
+                        <a:alpha val="43137"/>
+                      </a:srgbClr>
+                    </a:outerShdw>
+                  </a:effectLst>
+                </a:rPr>
+                <a:t>&lt;90</a:t>
+              </a:r>
+              <a:endParaRPr lang="ru-RU" sz="3200" b="1" dirty="0">
                 <a:solidFill>
                   <a:sysClr val="windowText" lastClr="000000"/>
                 </a:solidFill>
@@ -5784,639 +5601,13 @@
         </p:sp>
         <p:sp>
           <p:nvSpPr>
-            <p:cNvPr id="64" name="Прямоугольник 63"/>
-            <p:cNvSpPr/>
-            <p:nvPr/>
-          </p:nvSpPr>
-          <p:spPr>
-            <a:xfrm>
-              <a:off x="5731935" y="3408512"/>
-              <a:ext cx="4348306" cy="2585323"/>
-            </a:xfrm>
-            <a:prstGeom prst="rect">
-              <a:avLst/>
-            </a:prstGeom>
-          </p:spPr>
-          <p:txBody>
-            <a:bodyPr wrap="none">
-              <a:spAutoFit/>
-            </a:bodyPr>
-            <a:lstStyle/>
-            <a:p>
-              <a:r>
-                <a:rPr lang="en-US" b="1" dirty="0" smtClean="0">
-                  <a:solidFill>
-                    <a:sysClr val="windowText" lastClr="000000"/>
-                  </a:solidFill>
-                  <a:effectLst>
-                    <a:outerShdw blurRad="38100" dist="38100" dir="2700000" algn="tl">
-                      <a:srgbClr val="000000">
-                        <a:alpha val="43137"/>
-                      </a:srgbClr>
-                    </a:outerShdw>
-                  </a:effectLst>
-                </a:rPr>
-                <a:t>0&lt;</a:t>
-              </a:r>
-              <a:r>
-                <a:rPr lang="el-GR" b="1" dirty="0" smtClean="0">
-                  <a:solidFill>
-                    <a:sysClr val="windowText" lastClr="000000"/>
-                  </a:solidFill>
-                  <a:effectLst>
-                    <a:outerShdw blurRad="38100" dist="38100" dir="2700000" algn="tl">
-                      <a:srgbClr val="000000">
-                        <a:alpha val="43137"/>
-                      </a:srgbClr>
-                    </a:outerShdw>
-                  </a:effectLst>
-                </a:rPr>
-                <a:t>θ</a:t>
-              </a:r>
-              <a:r>
-                <a:rPr lang="ru-RU" sz="1100" b="1" dirty="0" smtClean="0">
-                  <a:solidFill>
-                    <a:sysClr val="windowText" lastClr="000000"/>
-                  </a:solidFill>
-                  <a:effectLst>
-                    <a:outerShdw blurRad="38100" dist="38100" dir="2700000" algn="tl">
-                      <a:srgbClr val="000000">
-                        <a:alpha val="43137"/>
-                      </a:srgbClr>
-                    </a:outerShdw>
-                  </a:effectLst>
-                </a:rPr>
-                <a:t>0</a:t>
-              </a:r>
-              <a:r>
-                <a:rPr lang="en-US" b="1" dirty="0" smtClean="0">
-                  <a:solidFill>
-                    <a:sysClr val="windowText" lastClr="000000"/>
-                  </a:solidFill>
-                  <a:effectLst>
-                    <a:outerShdw blurRad="38100" dist="38100" dir="2700000" algn="tl">
-                      <a:srgbClr val="000000">
-                        <a:alpha val="43137"/>
-                      </a:srgbClr>
-                    </a:outerShdw>
-                  </a:effectLst>
-                </a:rPr>
-                <a:t>&lt;90 </a:t>
-              </a:r>
-              <a:endParaRPr lang="ru-RU" b="1" dirty="0" smtClean="0">
-                <a:solidFill>
-                  <a:sysClr val="windowText" lastClr="000000"/>
-                </a:solidFill>
-                <a:effectLst>
-                  <a:outerShdw blurRad="38100" dist="38100" dir="2700000" algn="tl">
-                    <a:srgbClr val="000000">
-                      <a:alpha val="43137"/>
-                    </a:srgbClr>
-                  </a:outerShdw>
-                </a:effectLst>
-              </a:endParaRPr>
-            </a:p>
-            <a:p>
-              <a:r>
-                <a:rPr lang="ru-RU" b="1" dirty="0" smtClean="0">
-                  <a:solidFill>
-                    <a:sysClr val="windowText" lastClr="000000"/>
-                  </a:solidFill>
-                  <a:effectLst>
-                    <a:outerShdw blurRad="38100" dist="38100" dir="2700000" algn="tl">
-                      <a:srgbClr val="000000">
-                        <a:alpha val="43137"/>
-                      </a:srgbClr>
-                    </a:outerShdw>
-                  </a:effectLst>
-                </a:rPr>
-                <a:t>При измерении энергетического спектра:</a:t>
-              </a:r>
-            </a:p>
-            <a:p>
-              <a:r>
-                <a:rPr lang="en-US" b="1" dirty="0" smtClean="0">
-                  <a:solidFill>
-                    <a:sysClr val="windowText" lastClr="000000"/>
-                  </a:solidFill>
-                  <a:effectLst>
-                    <a:outerShdw blurRad="38100" dist="38100" dir="2700000" algn="tl">
-                      <a:srgbClr val="000000">
-                        <a:alpha val="43137"/>
-                      </a:srgbClr>
-                    </a:outerShdw>
-                  </a:effectLst>
-                </a:rPr>
-                <a:t>0&lt;</a:t>
-              </a:r>
-              <a:r>
-                <a:rPr lang="el-GR" b="1" dirty="0" smtClean="0">
-                  <a:solidFill>
-                    <a:sysClr val="windowText" lastClr="000000"/>
-                  </a:solidFill>
-                  <a:effectLst>
-                    <a:outerShdw blurRad="38100" dist="38100" dir="2700000" algn="tl">
-                      <a:srgbClr val="000000">
-                        <a:alpha val="43137"/>
-                      </a:srgbClr>
-                    </a:outerShdw>
-                  </a:effectLst>
-                </a:rPr>
-                <a:t>ϕ</a:t>
-              </a:r>
-              <a:r>
-                <a:rPr lang="en-US" b="1" dirty="0" smtClean="0">
-                  <a:solidFill>
-                    <a:sysClr val="windowText" lastClr="000000"/>
-                  </a:solidFill>
-                  <a:effectLst>
-                    <a:outerShdw blurRad="38100" dist="38100" dir="2700000" algn="tl">
-                      <a:srgbClr val="000000">
-                        <a:alpha val="43137"/>
-                      </a:srgbClr>
-                    </a:outerShdw>
-                  </a:effectLst>
-                </a:rPr>
-                <a:t>&lt;</a:t>
-              </a:r>
-              <a:r>
-                <a:rPr lang="ru-RU" b="1" dirty="0" smtClean="0">
-                  <a:solidFill>
-                    <a:sysClr val="windowText" lastClr="000000"/>
-                  </a:solidFill>
-                  <a:effectLst>
-                    <a:outerShdw blurRad="38100" dist="38100" dir="2700000" algn="tl">
-                      <a:srgbClr val="000000">
-                        <a:alpha val="43137"/>
-                      </a:srgbClr>
-                    </a:outerShdw>
-                  </a:effectLst>
-                </a:rPr>
-                <a:t>359</a:t>
-              </a:r>
-              <a:endParaRPr lang="en-US" b="1" dirty="0" smtClean="0">
-                <a:solidFill>
-                  <a:sysClr val="windowText" lastClr="000000"/>
-                </a:solidFill>
-                <a:effectLst>
-                  <a:outerShdw blurRad="38100" dist="38100" dir="2700000" algn="tl">
-                    <a:srgbClr val="000000">
-                      <a:alpha val="43137"/>
-                    </a:srgbClr>
-                  </a:outerShdw>
-                </a:effectLst>
-              </a:endParaRPr>
-            </a:p>
-            <a:p>
-              <a:r>
-                <a:rPr lang="en-US" b="1" dirty="0" smtClean="0">
-                  <a:solidFill>
-                    <a:sysClr val="windowText" lastClr="000000"/>
-                  </a:solidFill>
-                  <a:effectLst>
-                    <a:outerShdw blurRad="38100" dist="38100" dir="2700000" algn="tl">
-                      <a:srgbClr val="000000">
-                        <a:alpha val="43137"/>
-                      </a:srgbClr>
-                    </a:outerShdw>
-                  </a:effectLst>
-                </a:rPr>
-                <a:t>0&lt;</a:t>
-              </a:r>
-              <a:r>
-                <a:rPr lang="el-GR" b="1" dirty="0" smtClean="0">
-                  <a:solidFill>
-                    <a:sysClr val="windowText" lastClr="000000"/>
-                  </a:solidFill>
-                  <a:effectLst>
-                    <a:outerShdw blurRad="38100" dist="38100" dir="2700000" algn="tl">
-                      <a:srgbClr val="000000">
-                        <a:alpha val="43137"/>
-                      </a:srgbClr>
-                    </a:outerShdw>
-                  </a:effectLst>
-                </a:rPr>
-                <a:t>θ</a:t>
-              </a:r>
-              <a:r>
-                <a:rPr lang="en-US" sz="1200" b="1" dirty="0" smtClean="0">
-                  <a:solidFill>
-                    <a:sysClr val="windowText" lastClr="000000"/>
-                  </a:solidFill>
-                  <a:effectLst>
-                    <a:outerShdw blurRad="38100" dist="38100" dir="2700000" algn="tl">
-                      <a:srgbClr val="000000">
-                        <a:alpha val="43137"/>
-                      </a:srgbClr>
-                    </a:outerShdw>
-                  </a:effectLst>
-                </a:rPr>
-                <a:t>E</a:t>
-              </a:r>
-              <a:r>
-                <a:rPr lang="en-US" b="1" dirty="0" smtClean="0">
-                  <a:solidFill>
-                    <a:sysClr val="windowText" lastClr="000000"/>
-                  </a:solidFill>
-                  <a:effectLst>
-                    <a:outerShdw blurRad="38100" dist="38100" dir="2700000" algn="tl">
-                      <a:srgbClr val="000000">
-                        <a:alpha val="43137"/>
-                      </a:srgbClr>
-                    </a:outerShdw>
-                  </a:effectLst>
-                </a:rPr>
-                <a:t>&lt;</a:t>
-              </a:r>
-              <a:r>
-                <a:rPr lang="ru-RU" b="1" dirty="0" smtClean="0">
-                  <a:solidFill>
-                    <a:sysClr val="windowText" lastClr="000000"/>
-                  </a:solidFill>
-                  <a:effectLst>
-                    <a:outerShdw blurRad="38100" dist="38100" dir="2700000" algn="tl">
-                      <a:srgbClr val="000000">
-                        <a:alpha val="43137"/>
-                      </a:srgbClr>
-                    </a:outerShdw>
-                  </a:effectLst>
-                </a:rPr>
-                <a:t>90</a:t>
-              </a:r>
-            </a:p>
-            <a:p>
-              <a:r>
-                <a:rPr lang="ru-RU" b="1" dirty="0" smtClean="0">
-                  <a:solidFill>
-                    <a:sysClr val="windowText" lastClr="000000"/>
-                  </a:solidFill>
-                  <a:effectLst>
-                    <a:outerShdw blurRad="38100" dist="38100" dir="2700000" algn="tl">
-                      <a:srgbClr val="000000">
-                        <a:alpha val="43137"/>
-                      </a:srgbClr>
-                    </a:outerShdw>
-                  </a:effectLst>
-                </a:rPr>
-                <a:t>При измерении распределении по</a:t>
-              </a:r>
-              <a:r>
-                <a:rPr lang="el-GR" b="1" dirty="0" smtClean="0">
-                  <a:solidFill>
-                    <a:sysClr val="windowText" lastClr="000000"/>
-                  </a:solidFill>
-                  <a:effectLst>
-                    <a:outerShdw blurRad="38100" dist="38100" dir="2700000" algn="tl">
-                      <a:srgbClr val="000000">
-                        <a:alpha val="43137"/>
-                      </a:srgbClr>
-                    </a:outerShdw>
-                  </a:effectLst>
-                </a:rPr>
-                <a:t> θ</a:t>
-              </a:r>
-              <a:r>
-                <a:rPr lang="ru-RU" b="1" dirty="0" smtClean="0">
-                  <a:solidFill>
-                    <a:sysClr val="windowText" lastClr="000000"/>
-                  </a:solidFill>
-                  <a:effectLst>
-                    <a:outerShdw blurRad="38100" dist="38100" dir="2700000" algn="tl">
-                      <a:srgbClr val="000000">
-                        <a:alpha val="43137"/>
-                      </a:srgbClr>
-                    </a:outerShdw>
-                  </a:effectLst>
-                </a:rPr>
-                <a:t>:</a:t>
-              </a:r>
-              <a:endParaRPr lang="ru-RU" b="1" dirty="0">
-                <a:solidFill>
-                  <a:sysClr val="windowText" lastClr="000000"/>
-                </a:solidFill>
-                <a:effectLst>
-                  <a:outerShdw blurRad="38100" dist="38100" dir="2700000" algn="tl">
-                    <a:srgbClr val="000000">
-                      <a:alpha val="43137"/>
-                    </a:srgbClr>
-                  </a:outerShdw>
-                </a:effectLst>
-              </a:endParaRPr>
-            </a:p>
-            <a:p>
-              <a:r>
-                <a:rPr lang="en-US" b="1" dirty="0" smtClean="0">
-                  <a:solidFill>
-                    <a:sysClr val="windowText" lastClr="000000"/>
-                  </a:solidFill>
-                  <a:effectLst>
-                    <a:outerShdw blurRad="38100" dist="38100" dir="2700000" algn="tl">
-                      <a:srgbClr val="000000">
-                        <a:alpha val="43137"/>
-                      </a:srgbClr>
-                    </a:outerShdw>
-                  </a:effectLst>
-                </a:rPr>
-                <a:t>0&lt;</a:t>
-              </a:r>
-              <a:r>
-                <a:rPr lang="el-GR" b="1" dirty="0" smtClean="0">
-                  <a:solidFill>
-                    <a:sysClr val="windowText" lastClr="000000"/>
-                  </a:solidFill>
-                  <a:effectLst>
-                    <a:outerShdw blurRad="38100" dist="38100" dir="2700000" algn="tl">
-                      <a:srgbClr val="000000">
-                        <a:alpha val="43137"/>
-                      </a:srgbClr>
-                    </a:outerShdw>
-                  </a:effectLst>
-                </a:rPr>
-                <a:t>ϕ</a:t>
-              </a:r>
-              <a:r>
-                <a:rPr lang="en-US" b="1" dirty="0" smtClean="0">
-                  <a:solidFill>
-                    <a:sysClr val="windowText" lastClr="000000"/>
-                  </a:solidFill>
-                  <a:effectLst>
-                    <a:outerShdw blurRad="38100" dist="38100" dir="2700000" algn="tl">
-                      <a:srgbClr val="000000">
-                        <a:alpha val="43137"/>
-                      </a:srgbClr>
-                    </a:outerShdw>
-                  </a:effectLst>
-                </a:rPr>
-                <a:t>&lt;1</a:t>
-              </a:r>
-              <a:r>
-                <a:rPr lang="ru-RU" b="1" dirty="0" smtClean="0">
-                  <a:solidFill>
-                    <a:sysClr val="windowText" lastClr="000000"/>
-                  </a:solidFill>
-                  <a:effectLst>
-                    <a:outerShdw blurRad="38100" dist="38100" dir="2700000" algn="tl">
-                      <a:srgbClr val="000000">
-                        <a:alpha val="43137"/>
-                      </a:srgbClr>
-                    </a:outerShdw>
-                  </a:effectLst>
-                </a:rPr>
-                <a:t>79</a:t>
-              </a:r>
-              <a:endParaRPr lang="en-US" b="1" dirty="0" smtClean="0">
-                <a:solidFill>
-                  <a:sysClr val="windowText" lastClr="000000"/>
-                </a:solidFill>
-                <a:effectLst>
-                  <a:outerShdw blurRad="38100" dist="38100" dir="2700000" algn="tl">
-                    <a:srgbClr val="000000">
-                      <a:alpha val="43137"/>
-                    </a:srgbClr>
-                  </a:outerShdw>
-                </a:effectLst>
-              </a:endParaRPr>
-            </a:p>
-            <a:p>
-              <a:r>
-                <a:rPr lang="en-US" b="1" dirty="0">
-                  <a:solidFill>
-                    <a:sysClr val="windowText" lastClr="000000"/>
-                  </a:solidFill>
-                  <a:effectLst>
-                    <a:outerShdw blurRad="38100" dist="38100" dir="2700000" algn="tl">
-                      <a:srgbClr val="000000">
-                        <a:alpha val="43137"/>
-                      </a:srgbClr>
-                    </a:outerShdw>
-                  </a:effectLst>
-                </a:rPr>
-                <a:t>0&lt;</a:t>
-              </a:r>
-              <a:r>
-                <a:rPr lang="el-GR" b="1" dirty="0">
-                  <a:solidFill>
-                    <a:sysClr val="windowText" lastClr="000000"/>
-                  </a:solidFill>
-                  <a:effectLst>
-                    <a:outerShdw blurRad="38100" dist="38100" dir="2700000" algn="tl">
-                      <a:srgbClr val="000000">
-                        <a:alpha val="43137"/>
-                      </a:srgbClr>
-                    </a:outerShdw>
-                  </a:effectLst>
-                </a:rPr>
-                <a:t> </a:t>
-              </a:r>
-              <a:r>
-                <a:rPr lang="el-GR" b="1" dirty="0" smtClean="0">
-                  <a:solidFill>
-                    <a:sysClr val="windowText" lastClr="000000"/>
-                  </a:solidFill>
-                  <a:effectLst>
-                    <a:outerShdw blurRad="38100" dist="38100" dir="2700000" algn="tl">
-                      <a:srgbClr val="000000">
-                        <a:alpha val="43137"/>
-                      </a:srgbClr>
-                    </a:outerShdw>
-                  </a:effectLst>
-                </a:rPr>
-                <a:t>θ</a:t>
-              </a:r>
-              <a:r>
-                <a:rPr lang="en-US" b="1" dirty="0" smtClean="0">
-                  <a:solidFill>
-                    <a:sysClr val="windowText" lastClr="000000"/>
-                  </a:solidFill>
-                  <a:effectLst>
-                    <a:outerShdw blurRad="38100" dist="38100" dir="2700000" algn="tl">
-                      <a:srgbClr val="000000">
-                        <a:alpha val="43137"/>
-                      </a:srgbClr>
-                    </a:outerShdw>
-                  </a:effectLst>
-                </a:rPr>
-                <a:t>&lt;</a:t>
-              </a:r>
-              <a:r>
-                <a:rPr lang="ru-RU" b="1" dirty="0" smtClean="0">
-                  <a:solidFill>
-                    <a:sysClr val="windowText" lastClr="000000"/>
-                  </a:solidFill>
-                  <a:effectLst>
-                    <a:outerShdw blurRad="38100" dist="38100" dir="2700000" algn="tl">
-                      <a:srgbClr val="000000">
-                        <a:alpha val="43137"/>
-                      </a:srgbClr>
-                    </a:outerShdw>
-                  </a:effectLst>
-                </a:rPr>
-                <a:t>359</a:t>
-              </a:r>
-              <a:endParaRPr lang="en-US" b="1" dirty="0" smtClean="0">
-                <a:solidFill>
-                  <a:sysClr val="windowText" lastClr="000000"/>
-                </a:solidFill>
-                <a:effectLst>
-                  <a:outerShdw blurRad="38100" dist="38100" dir="2700000" algn="tl">
-                    <a:srgbClr val="000000">
-                      <a:alpha val="43137"/>
-                    </a:srgbClr>
-                  </a:outerShdw>
-                </a:effectLst>
-              </a:endParaRPr>
-            </a:p>
-            <a:p>
-              <a:r>
-                <a:rPr lang="ru-RU" b="1" dirty="0" smtClean="0">
-                  <a:solidFill>
-                    <a:sysClr val="windowText" lastClr="000000"/>
-                  </a:solidFill>
-                  <a:effectLst>
-                    <a:outerShdw blurRad="38100" dist="38100" dir="2700000" algn="tl">
-                      <a:srgbClr val="000000">
-                        <a:alpha val="43137"/>
-                      </a:srgbClr>
-                    </a:outerShdw>
-                  </a:effectLst>
-                </a:rPr>
-                <a:t>Важно! Не путать </a:t>
-              </a:r>
-              <a:r>
-                <a:rPr lang="el-GR" b="1" dirty="0" smtClean="0">
-                  <a:solidFill>
-                    <a:sysClr val="windowText" lastClr="000000"/>
-                  </a:solidFill>
-                  <a:effectLst>
-                    <a:outerShdw blurRad="38100" dist="38100" dir="2700000" algn="tl">
-                      <a:srgbClr val="000000">
-                        <a:alpha val="43137"/>
-                      </a:srgbClr>
-                    </a:outerShdw>
-                  </a:effectLst>
-                </a:rPr>
-                <a:t>θ</a:t>
-              </a:r>
-              <a:r>
-                <a:rPr lang="en-US" sz="1200" b="1" dirty="0" smtClean="0">
-                  <a:solidFill>
-                    <a:sysClr val="windowText" lastClr="000000"/>
-                  </a:solidFill>
-                  <a:effectLst>
-                    <a:outerShdw blurRad="38100" dist="38100" dir="2700000" algn="tl">
-                      <a:srgbClr val="000000">
-                        <a:alpha val="43137"/>
-                      </a:srgbClr>
-                    </a:outerShdw>
-                  </a:effectLst>
-                </a:rPr>
-                <a:t>E</a:t>
-              </a:r>
-              <a:r>
-                <a:rPr lang="ru-RU" sz="1200" b="1" dirty="0" smtClean="0">
-                  <a:solidFill>
-                    <a:sysClr val="windowText" lastClr="000000"/>
-                  </a:solidFill>
-                  <a:effectLst>
-                    <a:outerShdw blurRad="38100" dist="38100" dir="2700000" algn="tl">
-                      <a:srgbClr val="000000">
-                        <a:alpha val="43137"/>
-                      </a:srgbClr>
-                    </a:outerShdw>
-                  </a:effectLst>
-                </a:rPr>
-                <a:t> </a:t>
-              </a:r>
-              <a:r>
-                <a:rPr lang="ru-RU" b="1" dirty="0" smtClean="0">
-                  <a:solidFill>
-                    <a:sysClr val="windowText" lastClr="000000"/>
-                  </a:solidFill>
-                  <a:effectLst>
-                    <a:outerShdw blurRad="38100" dist="38100" dir="2700000" algn="tl">
-                      <a:srgbClr val="000000">
-                        <a:alpha val="43137"/>
-                      </a:srgbClr>
-                    </a:outerShdw>
-                  </a:effectLst>
-                </a:rPr>
-                <a:t>и</a:t>
-              </a:r>
-              <a:r>
-                <a:rPr lang="ru-RU" sz="1200" b="1" dirty="0" smtClean="0">
-                  <a:solidFill>
-                    <a:sysClr val="windowText" lastClr="000000"/>
-                  </a:solidFill>
-                  <a:effectLst>
-                    <a:outerShdw blurRad="38100" dist="38100" dir="2700000" algn="tl">
-                      <a:srgbClr val="000000">
-                        <a:alpha val="43137"/>
-                      </a:srgbClr>
-                    </a:outerShdw>
-                  </a:effectLst>
-                </a:rPr>
-                <a:t> </a:t>
-              </a:r>
-              <a:r>
-                <a:rPr lang="el-GR" b="1" dirty="0" smtClean="0">
-                  <a:solidFill>
-                    <a:sysClr val="windowText" lastClr="000000"/>
-                  </a:solidFill>
-                  <a:effectLst>
-                    <a:outerShdw blurRad="38100" dist="38100" dir="2700000" algn="tl">
-                      <a:srgbClr val="000000">
-                        <a:alpha val="43137"/>
-                      </a:srgbClr>
-                    </a:outerShdw>
-                  </a:effectLst>
-                </a:rPr>
-                <a:t>θ</a:t>
-              </a:r>
-              <a:r>
-                <a:rPr lang="ru-RU" b="1" dirty="0" smtClean="0">
-                  <a:solidFill>
-                    <a:sysClr val="windowText" lastClr="000000"/>
-                  </a:solidFill>
-                  <a:effectLst>
-                    <a:outerShdw blurRad="38100" dist="38100" dir="2700000" algn="tl">
-                      <a:srgbClr val="000000">
-                        <a:alpha val="43137"/>
-                      </a:srgbClr>
-                    </a:outerShdw>
-                  </a:effectLst>
-                </a:rPr>
-                <a:t> при задании</a:t>
-              </a:r>
-            </a:p>
-            <a:p>
-              <a:r>
-                <a:rPr lang="ru-RU" b="1" dirty="0" smtClean="0">
-                  <a:solidFill>
-                    <a:sysClr val="windowText" lastClr="000000"/>
-                  </a:solidFill>
-                  <a:effectLst>
-                    <a:outerShdw blurRad="38100" dist="38100" dir="2700000" algn="tl">
-                      <a:srgbClr val="000000">
-                        <a:alpha val="43137"/>
-                      </a:srgbClr>
-                    </a:outerShdw>
-                  </a:effectLst>
-                </a:rPr>
-                <a:t>параметров расчёта.</a:t>
-              </a:r>
-              <a:endParaRPr lang="ru-RU" dirty="0"/>
-            </a:p>
-          </p:txBody>
-        </p:sp>
-        <p:sp>
-          <p:nvSpPr>
             <p:cNvPr id="65" name="Дуга 64"/>
             <p:cNvSpPr/>
             <p:nvPr/>
           </p:nvSpPr>
           <p:spPr>
             <a:xfrm rot="19540383">
-              <a:off x="5022989" y="1946689"/>
+              <a:off x="5200789" y="1845089"/>
               <a:ext cx="1295400" cy="1191496"/>
             </a:xfrm>
             <a:prstGeom prst="arc">
@@ -6465,7 +5656,7 @@
           </p:nvSpPr>
           <p:spPr>
             <a:xfrm>
-              <a:off x="5655444" y="1502898"/>
+              <a:off x="5833244" y="1401298"/>
               <a:ext cx="694267" cy="550755"/>
             </a:xfrm>
             <a:prstGeom prst="rect">
@@ -6498,7 +5689,7 @@
             <a:p>
               <a:pPr algn="ctr"/>
               <a:r>
-                <a:rPr lang="el-GR" sz="2400" b="1" dirty="0" smtClean="0">
+                <a:rPr lang="el-GR" sz="2400" b="1" dirty="0">
                   <a:solidFill>
                     <a:sysClr val="windowText" lastClr="000000"/>
                   </a:solidFill>
@@ -6511,21 +5702,6 @@
                   </a:effectLst>
                 </a:rPr>
                 <a:t>θ</a:t>
-              </a:r>
-              <a:r>
-                <a:rPr lang="en-US" sz="1400" b="1" dirty="0" smtClean="0">
-                  <a:solidFill>
-                    <a:sysClr val="windowText" lastClr="000000"/>
-                  </a:solidFill>
-                  <a:effectLst>
-                    <a:outerShdw blurRad="38100" dist="38100" dir="2700000" algn="tl">
-                      <a:srgbClr val="000000">
-                        <a:alpha val="43137"/>
-                      </a:srgbClr>
-                    </a:outerShdw>
-                  </a:effectLst>
-                </a:rPr>
-                <a:t>E</a:t>
               </a:r>
               <a:endParaRPr lang="ru-RU" sz="2400" b="1" dirty="0">
                 <a:solidFill>

</xml_diff>